<commit_message>
tạo file css mới
</commit_message>
<xml_diff>
--- a/Git-presentation-16072017.pptx
+++ b/Git-presentation-16072017.pptx
@@ -5,7 +5,7 @@
     <p:sldMasterId id="2147483662" r:id="rId1"/>
   </p:sldMasterIdLst>
   <p:notesMasterIdLst>
-    <p:notesMasterId r:id="rId16"/>
+    <p:notesMasterId r:id="rId15"/>
   </p:notesMasterIdLst>
   <p:sldIdLst>
     <p:sldId id="256" r:id="rId2"/>
@@ -21,38 +21,37 @@
     <p:sldId id="269" r:id="rId12"/>
     <p:sldId id="270" r:id="rId13"/>
     <p:sldId id="271" r:id="rId14"/>
-    <p:sldId id="272" r:id="rId15"/>
   </p:sldIdLst>
   <p:sldSz cx="24384000" cy="13716000"/>
   <p:notesSz cx="6858000" cy="9144000"/>
   <p:embeddedFontLst>
     <p:embeddedFont>
+      <p:font typeface="Helvetica Neue" panose="020B0604020202020204" charset="0"/>
+      <p:regular r:id="rId16"/>
+      <p:bold r:id="rId17"/>
+      <p:italic r:id="rId18"/>
+      <p:boldItalic r:id="rId19"/>
+    </p:embeddedFont>
+    <p:embeddedFont>
+      <p:font typeface="Merriweather" panose="020B0604020202020204" charset="-93"/>
+      <p:regular r:id="rId20"/>
+      <p:bold r:id="rId21"/>
+      <p:italic r:id="rId22"/>
+      <p:boldItalic r:id="rId23"/>
+    </p:embeddedFont>
+    <p:embeddedFont>
       <p:font typeface="Helvetica Neue Light" panose="020B0604020202020204" charset="0"/>
-      <p:regular r:id="rId17"/>
-      <p:bold r:id="rId18"/>
-      <p:italic r:id="rId19"/>
-      <p:boldItalic r:id="rId20"/>
+      <p:regular r:id="rId24"/>
+      <p:bold r:id="rId25"/>
+      <p:italic r:id="rId26"/>
+      <p:boldItalic r:id="rId27"/>
     </p:embeddedFont>
     <p:embeddedFont>
       <p:font typeface="Roboto" panose="020B0604020202020204" charset="0"/>
-      <p:regular r:id="rId21"/>
-      <p:bold r:id="rId22"/>
-      <p:italic r:id="rId23"/>
-      <p:boldItalic r:id="rId24"/>
-    </p:embeddedFont>
-    <p:embeddedFont>
-      <p:font typeface="Helvetica Neue" panose="020B0604020202020204" charset="0"/>
-      <p:regular r:id="rId25"/>
-      <p:bold r:id="rId26"/>
-      <p:italic r:id="rId27"/>
-      <p:boldItalic r:id="rId28"/>
-    </p:embeddedFont>
-    <p:embeddedFont>
-      <p:font typeface="Merriweather" panose="020B0604020202020204" charset="-93"/>
-      <p:regular r:id="rId29"/>
-      <p:bold r:id="rId30"/>
-      <p:italic r:id="rId31"/>
-      <p:boldItalic r:id="rId32"/>
+      <p:regular r:id="rId28"/>
+      <p:bold r:id="rId29"/>
+      <p:italic r:id="rId30"/>
+      <p:boldItalic r:id="rId31"/>
     </p:embeddedFont>
   </p:embeddedFontLst>
   <p:defaultTextStyle>
@@ -1273,110 +1272,6 @@
       <p:sp>
         <p:nvSpPr>
           <p:cNvPr id="175" name="Google Shape;175;p22:notes"/>
-          <p:cNvSpPr>
-            <a:spLocks noGrp="1" noRot="1" noChangeAspect="1"/>
-          </p:cNvSpPr>
-          <p:nvPr>
-            <p:ph type="sldImg" idx="2"/>
-          </p:nvPr>
-        </p:nvSpPr>
-        <p:spPr>
-          <a:xfrm>
-            <a:off x="381000" y="685800"/>
-            <a:ext cx="6096000" cy="3429000"/>
-          </a:xfrm>
-          <a:custGeom>
-            <a:avLst/>
-            <a:gdLst/>
-            <a:ahLst/>
-            <a:cxnLst/>
-            <a:rect l="l" t="t" r="r" b="b"/>
-            <a:pathLst>
-              <a:path w="120000" h="120000" extrusionOk="0">
-                <a:moveTo>
-                  <a:pt x="0" y="0"/>
-                </a:moveTo>
-                <a:lnTo>
-                  <a:pt x="120000" y="0"/>
-                </a:lnTo>
-                <a:lnTo>
-                  <a:pt x="120000" y="120000"/>
-                </a:lnTo>
-                <a:lnTo>
-                  <a:pt x="0" y="120000"/>
-                </a:lnTo>
-                <a:close/>
-              </a:path>
-            </a:pathLst>
-          </a:custGeom>
-        </p:spPr>
-      </p:sp>
-    </p:spTree>
-  </p:cSld>
-  <p:clrMapOvr>
-    <a:masterClrMapping/>
-  </p:clrMapOvr>
-</p:notes>
-</file>
-
-<file path=ppt/notesSlides/notesSlide14.xml><?xml version="1.0" encoding="utf-8"?>
-<p:notes xmlns:a="http://schemas.openxmlformats.org/drawingml/2006/main" xmlns:r="http://schemas.openxmlformats.org/officeDocument/2006/relationships" xmlns:p="http://schemas.openxmlformats.org/presentationml/2006/main" showMasterSp="0" showMasterPhAnim="0">
-  <p:cSld>
-    <p:spTree>
-      <p:nvGrpSpPr>
-        <p:cNvPr id="1" name="Shape 180"/>
-        <p:cNvGrpSpPr/>
-        <p:nvPr/>
-      </p:nvGrpSpPr>
-      <p:grpSpPr>
-        <a:xfrm>
-          <a:off x="0" y="0"/>
-          <a:ext cx="0" cy="0"/>
-          <a:chOff x="0" y="0"/>
-          <a:chExt cx="0" cy="0"/>
-        </a:xfrm>
-      </p:grpSpPr>
-      <p:sp>
-        <p:nvSpPr>
-          <p:cNvPr id="181" name="Google Shape;181;p23:notes"/>
-          <p:cNvSpPr txBox="1">
-            <a:spLocks noGrp="1"/>
-          </p:cNvSpPr>
-          <p:nvPr>
-            <p:ph type="body" idx="1"/>
-          </p:nvPr>
-        </p:nvSpPr>
-        <p:spPr>
-          <a:xfrm>
-            <a:off x="914400" y="4343400"/>
-            <a:ext cx="5029200" cy="4114800"/>
-          </a:xfrm>
-          <a:prstGeom prst="rect">
-            <a:avLst/>
-          </a:prstGeom>
-        </p:spPr>
-        <p:txBody>
-          <a:bodyPr spcFirstLastPara="1" wrap="square" lIns="91425" tIns="91425" rIns="91425" bIns="91425" anchor="t" anchorCtr="0">
-            <a:noAutofit/>
-          </a:bodyPr>
-          <a:lstStyle/>
-          <a:p>
-            <a:pPr marL="0" lvl="0" indent="0" algn="l" rtl="0">
-              <a:spcBef>
-                <a:spcPts val="0"/>
-              </a:spcBef>
-              <a:spcAft>
-                <a:spcPts val="0"/>
-              </a:spcAft>
-              <a:buNone/>
-            </a:pPr>
-            <a:endParaRPr/>
-          </a:p>
-        </p:txBody>
-      </p:sp>
-      <p:sp>
-        <p:nvSpPr>
-          <p:cNvPr id="182" name="Google Shape;182;p23:notes"/>
           <p:cNvSpPr>
             <a:spLocks noGrp="1" noRot="1" noChangeAspect="1"/>
           </p:cNvSpPr>
@@ -13249,7 +13144,7 @@
               <a:buChar char="•"/>
             </a:pPr>
             <a:r>
-              <a:rPr lang="en-US" sz="4800" b="0" i="0" u="none" strike="noStrike" cap="none">
+              <a:rPr lang="en-US" sz="4800" b="0" i="0" u="none" strike="noStrike" cap="none" dirty="0" err="1">
                 <a:solidFill>
                   <a:srgbClr val="253858"/>
                 </a:solidFill>
@@ -13258,9 +13153,21 @@
                 <a:cs typeface="Helvetica Neue"/>
                 <a:sym typeface="Helvetica Neue"/>
               </a:rPr>
-              <a:t>git branch</a:t>
+              <a:t>git</a:t>
             </a:r>
-            <a:endParaRPr/>
+            <a:r>
+              <a:rPr lang="en-US" sz="4800" b="0" i="0" u="none" strike="noStrike" cap="none" dirty="0">
+                <a:solidFill>
+                  <a:srgbClr val="253858"/>
+                </a:solidFill>
+                <a:latin typeface="Helvetica Neue"/>
+                <a:ea typeface="Helvetica Neue"/>
+                <a:cs typeface="Helvetica Neue"/>
+                <a:sym typeface="Helvetica Neue"/>
+              </a:rPr>
+              <a:t> branch</a:t>
+            </a:r>
+            <a:endParaRPr dirty="0"/>
           </a:p>
           <a:p>
             <a:pPr marL="635000" marR="0" lvl="0" indent="-635000" algn="l" rtl="0">
@@ -13281,7 +13188,7 @@
               <a:buChar char="•"/>
             </a:pPr>
             <a:r>
-              <a:rPr lang="en-US" sz="4800" b="0" i="0" u="none" strike="noStrike" cap="none">
+              <a:rPr lang="en-US" sz="4800" b="0" i="0" u="none" strike="noStrike" cap="none" dirty="0" err="1">
                 <a:solidFill>
                   <a:srgbClr val="253858"/>
                 </a:solidFill>
@@ -13290,9 +13197,33 @@
                 <a:cs typeface="Helvetica Neue"/>
                 <a:sym typeface="Helvetica Neue"/>
               </a:rPr>
-              <a:t>git checkout</a:t>
+              <a:t>git</a:t>
             </a:r>
-            <a:endParaRPr/>
+            <a:r>
+              <a:rPr lang="en-US" sz="4800" b="0" i="0" u="none" strike="noStrike" cap="none" dirty="0">
+                <a:solidFill>
+                  <a:srgbClr val="253858"/>
+                </a:solidFill>
+                <a:latin typeface="Helvetica Neue"/>
+                <a:ea typeface="Helvetica Neue"/>
+                <a:cs typeface="Helvetica Neue"/>
+                <a:sym typeface="Helvetica Neue"/>
+              </a:rPr>
+              <a:t> </a:t>
+            </a:r>
+            <a:r>
+              <a:rPr lang="en-US" sz="4800" b="0" i="0" u="none" strike="noStrike" cap="none" dirty="0" smtClean="0">
+                <a:solidFill>
+                  <a:srgbClr val="253858"/>
+                </a:solidFill>
+                <a:latin typeface="Helvetica Neue"/>
+                <a:ea typeface="Helvetica Neue"/>
+                <a:cs typeface="Helvetica Neue"/>
+                <a:sym typeface="Helvetica Neue"/>
+              </a:rPr>
+              <a:t>checkout </a:t>
+            </a:r>
+            <a:endParaRPr dirty="0"/>
           </a:p>
           <a:p>
             <a:pPr marL="635000" marR="0" lvl="0" indent="-635000" algn="l" rtl="0">
@@ -13313,7 +13244,7 @@
               <a:buChar char="•"/>
             </a:pPr>
             <a:r>
-              <a:rPr lang="en-US" sz="4800" b="0" i="0" u="none" strike="noStrike" cap="none">
+              <a:rPr lang="en-US" sz="4800" b="0" i="0" u="none" strike="noStrike" cap="none" dirty="0" err="1">
                 <a:solidFill>
                   <a:srgbClr val="253858"/>
                 </a:solidFill>
@@ -13322,9 +13253,21 @@
                 <a:cs typeface="Helvetica Neue"/>
                 <a:sym typeface="Helvetica Neue"/>
               </a:rPr>
-              <a:t>git merge</a:t>
+              <a:t>git</a:t>
             </a:r>
-            <a:endParaRPr/>
+            <a:r>
+              <a:rPr lang="en-US" sz="4800" b="0" i="0" u="none" strike="noStrike" cap="none" dirty="0">
+                <a:solidFill>
+                  <a:srgbClr val="253858"/>
+                </a:solidFill>
+                <a:latin typeface="Helvetica Neue"/>
+                <a:ea typeface="Helvetica Neue"/>
+                <a:cs typeface="Helvetica Neue"/>
+                <a:sym typeface="Helvetica Neue"/>
+              </a:rPr>
+              <a:t> merge</a:t>
+            </a:r>
+            <a:endParaRPr dirty="0"/>
           </a:p>
           <a:p>
             <a:pPr marL="0" marR="0" lvl="0" indent="0" algn="l" rtl="0">
@@ -13343,7 +13286,7 @@
               <a:buFont typeface="Helvetica Neue"/>
               <a:buNone/>
             </a:pPr>
-            <a:endParaRPr sz="4800">
+            <a:endParaRPr sz="4800" dirty="0">
               <a:solidFill>
                 <a:srgbClr val="253858"/>
               </a:solidFill>
@@ -13370,99 +13313,7 @@
               <a:buFont typeface="Helvetica Neue"/>
               <a:buNone/>
             </a:pPr>
-            <a:r>
-              <a:rPr lang="en-US" sz="4800">
-                <a:solidFill>
-                  <a:srgbClr val="253858"/>
-                </a:solidFill>
-                <a:latin typeface="Helvetica Neue"/>
-                <a:ea typeface="Helvetica Neue"/>
-                <a:cs typeface="Helvetica Neue"/>
-                <a:sym typeface="Helvetica Neue"/>
-              </a:rPr>
-              <a:t>Nâng cao</a:t>
-            </a:r>
-            <a:endParaRPr sz="4800">
-              <a:solidFill>
-                <a:srgbClr val="253858"/>
-              </a:solidFill>
-              <a:latin typeface="Helvetica Neue"/>
-              <a:ea typeface="Helvetica Neue"/>
-              <a:cs typeface="Helvetica Neue"/>
-              <a:sym typeface="Helvetica Neue"/>
-            </a:endParaRPr>
-          </a:p>
-          <a:p>
-            <a:pPr marL="635000" marR="0" lvl="0" indent="-635000" algn="l" rtl="0">
-              <a:lnSpc>
-                <a:spcPct val="100000"/>
-              </a:lnSpc>
-              <a:spcBef>
-                <a:spcPts val="0"/>
-              </a:spcBef>
-              <a:spcAft>
-                <a:spcPts val="0"/>
-              </a:spcAft>
-              <a:buClr>
-                <a:srgbClr val="253858"/>
-              </a:buClr>
-              <a:buSzPts val="6000"/>
-              <a:buFont typeface="Helvetica Neue"/>
-              <a:buChar char="•"/>
-            </a:pPr>
-            <a:r>
-              <a:rPr lang="en-US" sz="4800" b="0" i="0" u="none" strike="noStrike" cap="none">
-                <a:solidFill>
-                  <a:srgbClr val="253858"/>
-                </a:solidFill>
-                <a:latin typeface="Helvetica Neue"/>
-                <a:ea typeface="Helvetica Neue"/>
-                <a:cs typeface="Helvetica Neue"/>
-                <a:sym typeface="Helvetica Neue"/>
-              </a:rPr>
-              <a:t>git rebase</a:t>
-            </a:r>
-            <a:endParaRPr sz="4800" b="0" i="0" u="none" strike="noStrike" cap="none">
-              <a:solidFill>
-                <a:srgbClr val="253858"/>
-              </a:solidFill>
-              <a:latin typeface="Helvetica Neue"/>
-              <a:ea typeface="Helvetica Neue"/>
-              <a:cs typeface="Helvetica Neue"/>
-              <a:sym typeface="Helvetica Neue"/>
-            </a:endParaRPr>
-          </a:p>
-          <a:p>
-            <a:pPr marL="635000" marR="0" lvl="0" indent="-558800" algn="l" rtl="0">
-              <a:lnSpc>
-                <a:spcPct val="100000"/>
-              </a:lnSpc>
-              <a:spcBef>
-                <a:spcPts val="0"/>
-              </a:spcBef>
-              <a:spcAft>
-                <a:spcPts val="0"/>
-              </a:spcAft>
-              <a:buClr>
-                <a:srgbClr val="253858"/>
-              </a:buClr>
-              <a:buSzPts val="4800"/>
-              <a:buFont typeface="Helvetica Neue"/>
-              <a:buChar char="•"/>
-            </a:pPr>
-            <a:r>
-              <a:rPr lang="en-US" sz="4800">
-                <a:solidFill>
-                  <a:srgbClr val="253858"/>
-                </a:solidFill>
-                <a:latin typeface="Helvetica Neue"/>
-                <a:ea typeface="Helvetica Neue"/>
-                <a:cs typeface="Helvetica Neue"/>
-                <a:sym typeface="Helvetica Neue"/>
-              </a:rPr>
-              <a:t>git cherry-pick</a:t>
-            </a:r>
-            <a:endParaRPr sz="4800">
+            <a:endParaRPr sz="4800" dirty="0">
               <a:solidFill>
                 <a:srgbClr val="253858"/>
               </a:solidFill>
@@ -13891,431 +13742,6 @@
 </p:sld>
 </file>
 
-<file path=ppt/slides/slide14.xml><?xml version="1.0" encoding="utf-8"?>
-<p:sld xmlns:a="http://schemas.openxmlformats.org/drawingml/2006/main" xmlns:r="http://schemas.openxmlformats.org/officeDocument/2006/relationships" xmlns:p="http://schemas.openxmlformats.org/presentationml/2006/main">
-  <p:cSld>
-    <p:spTree>
-      <p:nvGrpSpPr>
-        <p:cNvPr id="1" name="Shape 183"/>
-        <p:cNvGrpSpPr/>
-        <p:nvPr/>
-      </p:nvGrpSpPr>
-      <p:grpSpPr>
-        <a:xfrm>
-          <a:off x="0" y="0"/>
-          <a:ext cx="0" cy="0"/>
-          <a:chOff x="0" y="0"/>
-          <a:chExt cx="0" cy="0"/>
-        </a:xfrm>
-      </p:grpSpPr>
-      <p:sp>
-        <p:nvSpPr>
-          <p:cNvPr id="184" name="Google Shape;184;p32"/>
-          <p:cNvSpPr txBox="1">
-            <a:spLocks noGrp="1"/>
-          </p:cNvSpPr>
-          <p:nvPr>
-            <p:ph type="body" idx="1"/>
-          </p:nvPr>
-        </p:nvSpPr>
-        <p:spPr>
-          <a:xfrm>
-            <a:off x="1711021" y="3306937"/>
-            <a:ext cx="20828000" cy="1384301"/>
-          </a:xfrm>
-          <a:prstGeom prst="rect">
-            <a:avLst/>
-          </a:prstGeom>
-          <a:noFill/>
-          <a:ln>
-            <a:noFill/>
-          </a:ln>
-        </p:spPr>
-        <p:txBody>
-          <a:bodyPr spcFirstLastPara="1" wrap="square" lIns="50800" tIns="50800" rIns="50800" bIns="50800" anchor="t" anchorCtr="0">
-            <a:noAutofit/>
-          </a:bodyPr>
-          <a:lstStyle/>
-          <a:p>
-            <a:pPr marL="0" marR="0" lvl="0" indent="0" algn="l" rtl="0">
-              <a:lnSpc>
-                <a:spcPct val="100000"/>
-              </a:lnSpc>
-              <a:spcBef>
-                <a:spcPts val="0"/>
-              </a:spcBef>
-              <a:spcAft>
-                <a:spcPts val="0"/>
-              </a:spcAft>
-              <a:buClr>
-                <a:srgbClr val="253858"/>
-              </a:buClr>
-              <a:buFont typeface="Helvetica Neue"/>
-              <a:buNone/>
-            </a:pPr>
-            <a:r>
-              <a:rPr lang="en-US" sz="4800" b="1" i="0" u="none" strike="noStrike" cap="none">
-                <a:solidFill>
-                  <a:srgbClr val="253858"/>
-                </a:solidFill>
-                <a:latin typeface="Helvetica Neue"/>
-                <a:ea typeface="Helvetica Neue"/>
-                <a:cs typeface="Helvetica Neue"/>
-                <a:sym typeface="Helvetica Neue"/>
-              </a:rPr>
-              <a:t>Official git site and tutorial</a:t>
-            </a:r>
-            <a:endParaRPr/>
-          </a:p>
-          <a:p>
-            <a:pPr marL="0" marR="0" lvl="0" indent="0" algn="l" rtl="0">
-              <a:lnSpc>
-                <a:spcPct val="100000"/>
-              </a:lnSpc>
-              <a:spcBef>
-                <a:spcPts val="0"/>
-              </a:spcBef>
-              <a:spcAft>
-                <a:spcPts val="0"/>
-              </a:spcAft>
-              <a:buClr>
-                <a:srgbClr val="091E42"/>
-              </a:buClr>
-              <a:buFont typeface="Helvetica Neue"/>
-              <a:buNone/>
-            </a:pPr>
-            <a:r>
-              <a:rPr lang="en-US" sz="3600" b="0" i="0" u="sng" strike="noStrike" cap="none">
-                <a:solidFill>
-                  <a:schemeClr val="hlink"/>
-                </a:solidFill>
-                <a:latin typeface="Helvetica Neue"/>
-                <a:ea typeface="Helvetica Neue"/>
-                <a:cs typeface="Helvetica Neue"/>
-                <a:sym typeface="Helvetica Neue"/>
-                <a:hlinkClick r:id="rId3"/>
-              </a:rPr>
-              <a:t>https://git-scm.com</a:t>
-            </a:r>
-            <a:endParaRPr/>
-          </a:p>
-        </p:txBody>
-      </p:sp>
-      <p:sp>
-        <p:nvSpPr>
-          <p:cNvPr id="185" name="Google Shape;185;p32"/>
-          <p:cNvSpPr txBox="1">
-            <a:spLocks noGrp="1"/>
-          </p:cNvSpPr>
-          <p:nvPr>
-            <p:ph type="body" idx="2"/>
-          </p:nvPr>
-        </p:nvSpPr>
-        <p:spPr>
-          <a:xfrm>
-            <a:off x="1711021" y="1035446"/>
-            <a:ext cx="20828001" cy="838201"/>
-          </a:xfrm>
-          <a:prstGeom prst="rect">
-            <a:avLst/>
-          </a:prstGeom>
-          <a:noFill/>
-          <a:ln>
-            <a:noFill/>
-          </a:ln>
-        </p:spPr>
-        <p:txBody>
-          <a:bodyPr spcFirstLastPara="1" wrap="square" lIns="50800" tIns="50800" rIns="50800" bIns="50800" anchor="ctr" anchorCtr="0">
-            <a:noAutofit/>
-          </a:bodyPr>
-          <a:lstStyle/>
-          <a:p>
-            <a:pPr marL="0" marR="0" lvl="0" indent="0" algn="l" rtl="0">
-              <a:lnSpc>
-                <a:spcPct val="100000"/>
-              </a:lnSpc>
-              <a:spcBef>
-                <a:spcPts val="0"/>
-              </a:spcBef>
-              <a:spcAft>
-                <a:spcPts val="0"/>
-              </a:spcAft>
-              <a:buClr>
-                <a:srgbClr val="0747A6"/>
-              </a:buClr>
-              <a:buFont typeface="Helvetica Neue"/>
-              <a:buNone/>
-            </a:pPr>
-            <a:r>
-              <a:rPr lang="en-US" sz="4800" b="1" i="0" u="none" strike="noStrike" cap="none">
-                <a:solidFill>
-                  <a:srgbClr val="0747A6"/>
-                </a:solidFill>
-                <a:latin typeface="Helvetica Neue"/>
-                <a:ea typeface="Helvetica Neue"/>
-                <a:cs typeface="Helvetica Neue"/>
-                <a:sym typeface="Helvetica Neue"/>
-              </a:rPr>
-              <a:t>ADDITIONAL RESOURCES </a:t>
-            </a:r>
-            <a:endParaRPr/>
-          </a:p>
-        </p:txBody>
-      </p:sp>
-      <p:sp>
-        <p:nvSpPr>
-          <p:cNvPr id="186" name="Google Shape;186;p32"/>
-          <p:cNvSpPr txBox="1">
-            <a:spLocks noGrp="1"/>
-          </p:cNvSpPr>
-          <p:nvPr>
-            <p:ph type="body" idx="3"/>
-          </p:nvPr>
-        </p:nvSpPr>
-        <p:spPr>
-          <a:xfrm>
-            <a:off x="1711025" y="6158008"/>
-            <a:ext cx="20828100" cy="2318400"/>
-          </a:xfrm>
-          <a:prstGeom prst="rect">
-            <a:avLst/>
-          </a:prstGeom>
-          <a:noFill/>
-          <a:ln>
-            <a:noFill/>
-          </a:ln>
-        </p:spPr>
-        <p:txBody>
-          <a:bodyPr spcFirstLastPara="1" wrap="square" lIns="50800" tIns="50800" rIns="50800" bIns="50800" anchor="t" anchorCtr="0">
-            <a:noAutofit/>
-          </a:bodyPr>
-          <a:lstStyle/>
-          <a:p>
-            <a:pPr marL="0" marR="0" lvl="0" indent="0" algn="l" rtl="0">
-              <a:lnSpc>
-                <a:spcPct val="100000"/>
-              </a:lnSpc>
-              <a:spcBef>
-                <a:spcPts val="0"/>
-              </a:spcBef>
-              <a:spcAft>
-                <a:spcPts val="0"/>
-              </a:spcAft>
-              <a:buClr>
-                <a:srgbClr val="253858"/>
-              </a:buClr>
-              <a:buFont typeface="Helvetica Neue"/>
-              <a:buNone/>
-            </a:pPr>
-            <a:r>
-              <a:rPr lang="en-US" sz="4800" b="1" i="0" u="none" strike="noStrike" cap="none">
-                <a:solidFill>
-                  <a:srgbClr val="253858"/>
-                </a:solidFill>
-                <a:latin typeface="Helvetica Neue"/>
-                <a:ea typeface="Helvetica Neue"/>
-                <a:cs typeface="Helvetica Neue"/>
-                <a:sym typeface="Helvetica Neue"/>
-              </a:rPr>
-              <a:t>GitHub guides</a:t>
-            </a:r>
-            <a:endParaRPr/>
-          </a:p>
-          <a:p>
-            <a:pPr marL="0" marR="0" lvl="0" indent="0" algn="l" rtl="0">
-              <a:lnSpc>
-                <a:spcPct val="100000"/>
-              </a:lnSpc>
-              <a:spcBef>
-                <a:spcPts val="0"/>
-              </a:spcBef>
-              <a:spcAft>
-                <a:spcPts val="0"/>
-              </a:spcAft>
-              <a:buClr>
-                <a:srgbClr val="091E42"/>
-              </a:buClr>
-              <a:buFont typeface="Helvetica Neue"/>
-              <a:buNone/>
-            </a:pPr>
-            <a:r>
-              <a:rPr lang="en-US" sz="3600" u="sng">
-                <a:solidFill>
-                  <a:schemeClr val="hlink"/>
-                </a:solidFill>
-                <a:hlinkClick r:id="rId4"/>
-              </a:rPr>
-              <a:t>https://guides.github.com</a:t>
-            </a:r>
-            <a:endParaRPr sz="3600" u="sng">
-              <a:solidFill>
-                <a:schemeClr val="hlink"/>
-              </a:solidFill>
-            </a:endParaRPr>
-          </a:p>
-          <a:p>
-            <a:pPr marL="0" marR="0" lvl="0" indent="0" algn="l" rtl="0">
-              <a:lnSpc>
-                <a:spcPct val="100000"/>
-              </a:lnSpc>
-              <a:spcBef>
-                <a:spcPts val="0"/>
-              </a:spcBef>
-              <a:spcAft>
-                <a:spcPts val="0"/>
-              </a:spcAft>
-              <a:buClr>
-                <a:srgbClr val="091E42"/>
-              </a:buClr>
-              <a:buFont typeface="Helvetica Neue"/>
-              <a:buNone/>
-            </a:pPr>
-            <a:r>
-              <a:rPr lang="en-US" sz="3600" u="sng">
-                <a:solidFill>
-                  <a:schemeClr val="hlink"/>
-                </a:solidFill>
-                <a:hlinkClick r:id="rId5"/>
-              </a:rPr>
-              <a:t>https://learngitbranching.js.org</a:t>
-            </a:r>
-            <a:endParaRPr/>
-          </a:p>
-        </p:txBody>
-      </p:sp>
-      <p:sp>
-        <p:nvSpPr>
-          <p:cNvPr id="187" name="Google Shape;187;p32"/>
-          <p:cNvSpPr txBox="1">
-            <a:spLocks noGrp="1"/>
-          </p:cNvSpPr>
-          <p:nvPr>
-            <p:ph type="body" idx="4"/>
-          </p:nvPr>
-        </p:nvSpPr>
-        <p:spPr>
-          <a:xfrm>
-            <a:off x="1711021" y="9076670"/>
-            <a:ext cx="20828000" cy="1930401"/>
-          </a:xfrm>
-          <a:prstGeom prst="rect">
-            <a:avLst/>
-          </a:prstGeom>
-          <a:noFill/>
-          <a:ln>
-            <a:noFill/>
-          </a:ln>
-        </p:spPr>
-        <p:txBody>
-          <a:bodyPr spcFirstLastPara="1" wrap="square" lIns="50800" tIns="50800" rIns="50800" bIns="50800" anchor="t" anchorCtr="0">
-            <a:noAutofit/>
-          </a:bodyPr>
-          <a:lstStyle/>
-          <a:p>
-            <a:pPr marL="0" marR="0" lvl="0" indent="0" algn="l" rtl="0">
-              <a:lnSpc>
-                <a:spcPct val="100000"/>
-              </a:lnSpc>
-              <a:spcBef>
-                <a:spcPts val="0"/>
-              </a:spcBef>
-              <a:spcAft>
-                <a:spcPts val="0"/>
-              </a:spcAft>
-              <a:buClr>
-                <a:srgbClr val="253858"/>
-              </a:buClr>
-              <a:buFont typeface="Helvetica Neue"/>
-              <a:buNone/>
-            </a:pPr>
-            <a:r>
-              <a:rPr lang="en-US" sz="4800" b="1" i="0" u="none" strike="noStrike" cap="none">
-                <a:solidFill>
-                  <a:srgbClr val="253858"/>
-                </a:solidFill>
-                <a:latin typeface="Helvetica Neue"/>
-                <a:ea typeface="Helvetica Neue"/>
-                <a:cs typeface="Helvetica Neue"/>
-                <a:sym typeface="Helvetica Neue"/>
-              </a:rPr>
-              <a:t>Blogs</a:t>
-            </a:r>
-            <a:endParaRPr/>
-          </a:p>
-          <a:p>
-            <a:pPr marL="0" marR="0" lvl="0" indent="0" algn="l" rtl="0">
-              <a:lnSpc>
-                <a:spcPct val="100000"/>
-              </a:lnSpc>
-              <a:spcBef>
-                <a:spcPts val="0"/>
-              </a:spcBef>
-              <a:spcAft>
-                <a:spcPts val="0"/>
-              </a:spcAft>
-              <a:buClr>
-                <a:srgbClr val="091E42"/>
-              </a:buClr>
-              <a:buFont typeface="Helvetica Neue"/>
-              <a:buNone/>
-            </a:pPr>
-            <a:r>
-              <a:rPr lang="en-US" sz="3600" b="0" i="0" u="sng" strike="noStrike" cap="none">
-                <a:solidFill>
-                  <a:schemeClr val="hlink"/>
-                </a:solidFill>
-                <a:latin typeface="Helvetica Neue"/>
-                <a:ea typeface="Helvetica Neue"/>
-                <a:cs typeface="Helvetica Neue"/>
-                <a:sym typeface="Helvetica Neue"/>
-                <a:hlinkClick r:id="rId6"/>
-              </a:rPr>
-              <a:t>https://codeaholicguy.com/2015/11/06/github-mang-lai-cho-developer-nhung-gi/</a:t>
-            </a:r>
-            <a:endParaRPr/>
-          </a:p>
-          <a:p>
-            <a:pPr marL="0" marR="0" lvl="0" indent="0" algn="l" rtl="0">
-              <a:lnSpc>
-                <a:spcPct val="100000"/>
-              </a:lnSpc>
-              <a:spcBef>
-                <a:spcPts val="0"/>
-              </a:spcBef>
-              <a:spcAft>
-                <a:spcPts val="0"/>
-              </a:spcAft>
-              <a:buClr>
-                <a:srgbClr val="091E42"/>
-              </a:buClr>
-              <a:buFont typeface="Helvetica Neue"/>
-              <a:buNone/>
-            </a:pPr>
-            <a:r>
-              <a:rPr lang="en-US" sz="3600" b="0" i="0" u="sng" strike="noStrike" cap="none">
-                <a:solidFill>
-                  <a:schemeClr val="hlink"/>
-                </a:solidFill>
-                <a:latin typeface="Helvetica Neue"/>
-                <a:ea typeface="Helvetica Neue"/>
-                <a:cs typeface="Helvetica Neue"/>
-                <a:sym typeface="Helvetica Neue"/>
-                <a:hlinkClick r:id="rId7"/>
-              </a:rPr>
-              <a:t>https://toidicodedao.com/2015/08/04/tutorial-huong-dan-tich-hop-visual-studio-voi-github/</a:t>
-            </a:r>
-            <a:endParaRPr/>
-          </a:p>
-        </p:txBody>
-      </p:sp>
-    </p:spTree>
-  </p:cSld>
-  <p:clrMapOvr>
-    <a:masterClrMapping/>
-  </p:clrMapOvr>
-</p:sld>
-</file>
-
 <file path=ppt/slides/slide2.xml><?xml version="1.0" encoding="utf-8"?>
 <p:sld xmlns:a="http://schemas.openxmlformats.org/drawingml/2006/main" xmlns:r="http://schemas.openxmlformats.org/officeDocument/2006/relationships" xmlns:p="http://schemas.openxmlformats.org/presentationml/2006/main">
   <p:cSld>
@@ -16356,15 +15782,7 @@
                   <a:srgbClr val="253858"/>
                 </a:solidFill>
               </a:rPr>
-              <a:t>là nền tản quản lý mã nguồn trực </a:t>
-            </a:r>
-            <a:r>
-              <a:rPr lang="vi-VN" dirty="0" smtClean="0">
-                <a:solidFill>
-                  <a:srgbClr val="253858"/>
-                </a:solidFill>
-              </a:rPr>
-              <a:t>tuyến</a:t>
+              <a:t>là nền tản quản lý mã nguồn trực tuyến</a:t>
             </a:r>
           </a:p>
           <a:p>
@@ -16388,15 +15806,7 @@
                   <a:srgbClr val="253858"/>
                 </a:solidFill>
               </a:rPr>
-              <a:t> </a:t>
-            </a:r>
-            <a:r>
-              <a:rPr lang="vi-VN" dirty="0" smtClean="0">
-                <a:solidFill>
-                  <a:srgbClr val="253858"/>
-                </a:solidFill>
-              </a:rPr>
-              <a:t>sử dụng git để giúp lập trình viên quản lý chia sẽ và cộng tác </a:t>
+              <a:t> sử dụng git để giúp lập trình viên quản lý chia sẽ và cộng tác </a:t>
             </a:r>
             <a:r>
               <a:rPr lang="en-US" dirty="0" err="1" smtClean="0">

</xml_diff>

<commit_message>
thay doi du an lan thu 1
</commit_message>
<xml_diff>
--- a/Git-presentation-16072017.pptx
+++ b/Git-presentation-16072017.pptx
@@ -5,7 +5,7 @@
     <p:sldMasterId id="2147483662" r:id="rId1"/>
   </p:sldMasterIdLst>
   <p:notesMasterIdLst>
-    <p:notesMasterId r:id="rId15"/>
+    <p:notesMasterId r:id="rId13"/>
   </p:notesMasterIdLst>
   <p:sldIdLst>
     <p:sldId id="256" r:id="rId2"/>
@@ -19,39 +19,37 @@
     <p:sldId id="266" r:id="rId10"/>
     <p:sldId id="268" r:id="rId11"/>
     <p:sldId id="269" r:id="rId12"/>
-    <p:sldId id="270" r:id="rId13"/>
-    <p:sldId id="271" r:id="rId14"/>
   </p:sldIdLst>
   <p:sldSz cx="24384000" cy="13716000"/>
   <p:notesSz cx="6858000" cy="9144000"/>
   <p:embeddedFontLst>
     <p:embeddedFont>
-      <p:font typeface="Helvetica Neue" panose="020B0604020202020204" charset="0"/>
-      <p:regular r:id="rId16"/>
-      <p:bold r:id="rId17"/>
-      <p:italic r:id="rId18"/>
-      <p:boldItalic r:id="rId19"/>
+      <p:font typeface="Roboto" panose="020B0604020202020204" charset="0"/>
+      <p:regular r:id="rId14"/>
+      <p:bold r:id="rId15"/>
+      <p:italic r:id="rId16"/>
+      <p:boldItalic r:id="rId17"/>
     </p:embeddedFont>
     <p:embeddedFont>
       <p:font typeface="Merriweather" panose="020B0604020202020204" charset="-93"/>
-      <p:regular r:id="rId20"/>
-      <p:bold r:id="rId21"/>
-      <p:italic r:id="rId22"/>
-      <p:boldItalic r:id="rId23"/>
+      <p:regular r:id="rId18"/>
+      <p:bold r:id="rId19"/>
+      <p:italic r:id="rId20"/>
+      <p:boldItalic r:id="rId21"/>
+    </p:embeddedFont>
+    <p:embeddedFont>
+      <p:font typeface="Helvetica Neue" panose="020B0604020202020204" charset="0"/>
+      <p:regular r:id="rId22"/>
+      <p:bold r:id="rId23"/>
+      <p:italic r:id="rId24"/>
+      <p:boldItalic r:id="rId25"/>
     </p:embeddedFont>
     <p:embeddedFont>
       <p:font typeface="Helvetica Neue Light" panose="020B0604020202020204" charset="0"/>
-      <p:regular r:id="rId24"/>
-      <p:bold r:id="rId25"/>
-      <p:italic r:id="rId26"/>
-      <p:boldItalic r:id="rId27"/>
-    </p:embeddedFont>
-    <p:embeddedFont>
-      <p:font typeface="Roboto" panose="020B0604020202020204" charset="0"/>
-      <p:regular r:id="rId28"/>
-      <p:bold r:id="rId29"/>
-      <p:italic r:id="rId30"/>
-      <p:boldItalic r:id="rId31"/>
+      <p:regular r:id="rId26"/>
+      <p:bold r:id="rId27"/>
+      <p:italic r:id="rId28"/>
+      <p:boldItalic r:id="rId29"/>
     </p:embeddedFont>
   </p:embeddedFontLst>
   <p:defaultTextStyle>
@@ -1064,214 +1062,6 @@
       <p:sp>
         <p:nvSpPr>
           <p:cNvPr id="162" name="Google Shape;162;p20:notes"/>
-          <p:cNvSpPr>
-            <a:spLocks noGrp="1" noRot="1" noChangeAspect="1"/>
-          </p:cNvSpPr>
-          <p:nvPr>
-            <p:ph type="sldImg" idx="2"/>
-          </p:nvPr>
-        </p:nvSpPr>
-        <p:spPr>
-          <a:xfrm>
-            <a:off x="381000" y="685800"/>
-            <a:ext cx="6096000" cy="3429000"/>
-          </a:xfrm>
-          <a:custGeom>
-            <a:avLst/>
-            <a:gdLst/>
-            <a:ahLst/>
-            <a:cxnLst/>
-            <a:rect l="l" t="t" r="r" b="b"/>
-            <a:pathLst>
-              <a:path w="120000" h="120000" extrusionOk="0">
-                <a:moveTo>
-                  <a:pt x="0" y="0"/>
-                </a:moveTo>
-                <a:lnTo>
-                  <a:pt x="120000" y="0"/>
-                </a:lnTo>
-                <a:lnTo>
-                  <a:pt x="120000" y="120000"/>
-                </a:lnTo>
-                <a:lnTo>
-                  <a:pt x="0" y="120000"/>
-                </a:lnTo>
-                <a:close/>
-              </a:path>
-            </a:pathLst>
-          </a:custGeom>
-        </p:spPr>
-      </p:sp>
-    </p:spTree>
-  </p:cSld>
-  <p:clrMapOvr>
-    <a:masterClrMapping/>
-  </p:clrMapOvr>
-</p:notes>
-</file>
-
-<file path=ppt/notesSlides/notesSlide12.xml><?xml version="1.0" encoding="utf-8"?>
-<p:notes xmlns:a="http://schemas.openxmlformats.org/drawingml/2006/main" xmlns:r="http://schemas.openxmlformats.org/officeDocument/2006/relationships" xmlns:p="http://schemas.openxmlformats.org/presentationml/2006/main" showMasterSp="0" showMasterPhAnim="0">
-  <p:cSld>
-    <p:spTree>
-      <p:nvGrpSpPr>
-        <p:cNvPr id="1" name="Shape 167"/>
-        <p:cNvGrpSpPr/>
-        <p:nvPr/>
-      </p:nvGrpSpPr>
-      <p:grpSpPr>
-        <a:xfrm>
-          <a:off x="0" y="0"/>
-          <a:ext cx="0" cy="0"/>
-          <a:chOff x="0" y="0"/>
-          <a:chExt cx="0" cy="0"/>
-        </a:xfrm>
-      </p:grpSpPr>
-      <p:sp>
-        <p:nvSpPr>
-          <p:cNvPr id="168" name="Google Shape;168;p21:notes"/>
-          <p:cNvSpPr txBox="1">
-            <a:spLocks noGrp="1"/>
-          </p:cNvSpPr>
-          <p:nvPr>
-            <p:ph type="body" idx="1"/>
-          </p:nvPr>
-        </p:nvSpPr>
-        <p:spPr>
-          <a:xfrm>
-            <a:off x="914400" y="4343400"/>
-            <a:ext cx="5029200" cy="4114800"/>
-          </a:xfrm>
-          <a:prstGeom prst="rect">
-            <a:avLst/>
-          </a:prstGeom>
-        </p:spPr>
-        <p:txBody>
-          <a:bodyPr spcFirstLastPara="1" wrap="square" lIns="91425" tIns="91425" rIns="91425" bIns="91425" anchor="t" anchorCtr="0">
-            <a:noAutofit/>
-          </a:bodyPr>
-          <a:lstStyle/>
-          <a:p>
-            <a:pPr marL="0" lvl="0" indent="0" algn="l" rtl="0">
-              <a:spcBef>
-                <a:spcPts val="0"/>
-              </a:spcBef>
-              <a:spcAft>
-                <a:spcPts val="0"/>
-              </a:spcAft>
-              <a:buNone/>
-            </a:pPr>
-            <a:endParaRPr/>
-          </a:p>
-        </p:txBody>
-      </p:sp>
-      <p:sp>
-        <p:nvSpPr>
-          <p:cNvPr id="169" name="Google Shape;169;p21:notes"/>
-          <p:cNvSpPr>
-            <a:spLocks noGrp="1" noRot="1" noChangeAspect="1"/>
-          </p:cNvSpPr>
-          <p:nvPr>
-            <p:ph type="sldImg" idx="2"/>
-          </p:nvPr>
-        </p:nvSpPr>
-        <p:spPr>
-          <a:xfrm>
-            <a:off x="381000" y="685800"/>
-            <a:ext cx="6096000" cy="3429000"/>
-          </a:xfrm>
-          <a:custGeom>
-            <a:avLst/>
-            <a:gdLst/>
-            <a:ahLst/>
-            <a:cxnLst/>
-            <a:rect l="l" t="t" r="r" b="b"/>
-            <a:pathLst>
-              <a:path w="120000" h="120000" extrusionOk="0">
-                <a:moveTo>
-                  <a:pt x="0" y="0"/>
-                </a:moveTo>
-                <a:lnTo>
-                  <a:pt x="120000" y="0"/>
-                </a:lnTo>
-                <a:lnTo>
-                  <a:pt x="120000" y="120000"/>
-                </a:lnTo>
-                <a:lnTo>
-                  <a:pt x="0" y="120000"/>
-                </a:lnTo>
-                <a:close/>
-              </a:path>
-            </a:pathLst>
-          </a:custGeom>
-        </p:spPr>
-      </p:sp>
-    </p:spTree>
-  </p:cSld>
-  <p:clrMapOvr>
-    <a:masterClrMapping/>
-  </p:clrMapOvr>
-</p:notes>
-</file>
-
-<file path=ppt/notesSlides/notesSlide13.xml><?xml version="1.0" encoding="utf-8"?>
-<p:notes xmlns:a="http://schemas.openxmlformats.org/drawingml/2006/main" xmlns:r="http://schemas.openxmlformats.org/officeDocument/2006/relationships" xmlns:p="http://schemas.openxmlformats.org/presentationml/2006/main" showMasterSp="0" showMasterPhAnim="0">
-  <p:cSld>
-    <p:spTree>
-      <p:nvGrpSpPr>
-        <p:cNvPr id="1" name="Shape 173"/>
-        <p:cNvGrpSpPr/>
-        <p:nvPr/>
-      </p:nvGrpSpPr>
-      <p:grpSpPr>
-        <a:xfrm>
-          <a:off x="0" y="0"/>
-          <a:ext cx="0" cy="0"/>
-          <a:chOff x="0" y="0"/>
-          <a:chExt cx="0" cy="0"/>
-        </a:xfrm>
-      </p:grpSpPr>
-      <p:sp>
-        <p:nvSpPr>
-          <p:cNvPr id="174" name="Google Shape;174;p22:notes"/>
-          <p:cNvSpPr txBox="1">
-            <a:spLocks noGrp="1"/>
-          </p:cNvSpPr>
-          <p:nvPr>
-            <p:ph type="body" idx="1"/>
-          </p:nvPr>
-        </p:nvSpPr>
-        <p:spPr>
-          <a:xfrm>
-            <a:off x="914400" y="4343400"/>
-            <a:ext cx="5029200" cy="4114800"/>
-          </a:xfrm>
-          <a:prstGeom prst="rect">
-            <a:avLst/>
-          </a:prstGeom>
-        </p:spPr>
-        <p:txBody>
-          <a:bodyPr spcFirstLastPara="1" wrap="square" lIns="91425" tIns="91425" rIns="91425" bIns="91425" anchor="t" anchorCtr="0">
-            <a:noAutofit/>
-          </a:bodyPr>
-          <a:lstStyle/>
-          <a:p>
-            <a:pPr marL="0" lvl="0" indent="0" algn="l" rtl="0">
-              <a:spcBef>
-                <a:spcPts val="0"/>
-              </a:spcBef>
-              <a:spcAft>
-                <a:spcPts val="0"/>
-              </a:spcAft>
-              <a:buNone/>
-            </a:pPr>
-            <a:endParaRPr/>
-          </a:p>
-        </p:txBody>
-      </p:sp>
-      <p:sp>
-        <p:nvSpPr>
-          <p:cNvPr id="175" name="Google Shape;175;p22:notes"/>
           <p:cNvSpPr>
             <a:spLocks noGrp="1" noRot="1" noChangeAspect="1"/>
           </p:cNvSpPr>
@@ -13360,388 +13150,6 @@
 </p:sld>
 </file>
 
-<file path=ppt/slides/slide12.xml><?xml version="1.0" encoding="utf-8"?>
-<p:sld xmlns:a="http://schemas.openxmlformats.org/drawingml/2006/main" xmlns:r="http://schemas.openxmlformats.org/officeDocument/2006/relationships" xmlns:p="http://schemas.openxmlformats.org/presentationml/2006/main">
-  <p:cSld>
-    <p:spTree>
-      <p:nvGrpSpPr>
-        <p:cNvPr id="1" name="Shape 170"/>
-        <p:cNvGrpSpPr/>
-        <p:nvPr/>
-      </p:nvGrpSpPr>
-      <p:grpSpPr>
-        <a:xfrm>
-          <a:off x="0" y="0"/>
-          <a:ext cx="0" cy="0"/>
-          <a:chOff x="0" y="0"/>
-          <a:chExt cx="0" cy="0"/>
-        </a:xfrm>
-      </p:grpSpPr>
-      <p:sp>
-        <p:nvSpPr>
-          <p:cNvPr id="171" name="Google Shape;171;p30"/>
-          <p:cNvSpPr txBox="1">
-            <a:spLocks noGrp="1"/>
-          </p:cNvSpPr>
-          <p:nvPr>
-            <p:ph type="body" idx="1"/>
-          </p:nvPr>
-        </p:nvSpPr>
-        <p:spPr>
-          <a:xfrm>
-            <a:off x="4381243" y="5407024"/>
-            <a:ext cx="15621514" cy="1879601"/>
-          </a:xfrm>
-          <a:prstGeom prst="rect">
-            <a:avLst/>
-          </a:prstGeom>
-          <a:noFill/>
-          <a:ln>
-            <a:noFill/>
-          </a:ln>
-        </p:spPr>
-        <p:txBody>
-          <a:bodyPr spcFirstLastPara="1" wrap="square" lIns="38100" tIns="38100" rIns="38100" bIns="38100" anchor="b" anchorCtr="0">
-            <a:noAutofit/>
-          </a:bodyPr>
-          <a:lstStyle/>
-          <a:p>
-            <a:pPr marL="0" marR="0" lvl="0" indent="0" algn="ctr" rtl="0">
-              <a:lnSpc>
-                <a:spcPct val="100000"/>
-              </a:lnSpc>
-              <a:spcBef>
-                <a:spcPts val="0"/>
-              </a:spcBef>
-              <a:spcAft>
-                <a:spcPts val="0"/>
-              </a:spcAft>
-              <a:buClr>
-                <a:srgbClr val="FFFFFF"/>
-              </a:buClr>
-              <a:buFont typeface="Helvetica Neue"/>
-              <a:buNone/>
-            </a:pPr>
-            <a:r>
-              <a:rPr lang="en-US" sz="11800" b="1" i="0" u="none" strike="noStrike" cap="none">
-                <a:solidFill>
-                  <a:srgbClr val="FFFFFF"/>
-                </a:solidFill>
-                <a:latin typeface="Helvetica Neue"/>
-                <a:ea typeface="Helvetica Neue"/>
-                <a:cs typeface="Helvetica Neue"/>
-                <a:sym typeface="Helvetica Neue"/>
-              </a:rPr>
-              <a:t>Nâng cao</a:t>
-            </a:r>
-            <a:endParaRPr/>
-          </a:p>
-        </p:txBody>
-      </p:sp>
-      <p:sp>
-        <p:nvSpPr>
-          <p:cNvPr id="172" name="Google Shape;172;p30"/>
-          <p:cNvSpPr txBox="1">
-            <a:spLocks noGrp="1"/>
-          </p:cNvSpPr>
-          <p:nvPr>
-            <p:ph type="body" idx="2"/>
-          </p:nvPr>
-        </p:nvSpPr>
-        <p:spPr>
-          <a:xfrm>
-            <a:off x="4381243" y="7241381"/>
-            <a:ext cx="15621514" cy="774701"/>
-          </a:xfrm>
-          <a:prstGeom prst="rect">
-            <a:avLst/>
-          </a:prstGeom>
-          <a:noFill/>
-          <a:ln>
-            <a:noFill/>
-          </a:ln>
-        </p:spPr>
-        <p:txBody>
-          <a:bodyPr spcFirstLastPara="1" wrap="square" lIns="38100" tIns="38100" rIns="38100" bIns="38100" anchor="t" anchorCtr="0">
-            <a:noAutofit/>
-          </a:bodyPr>
-          <a:lstStyle/>
-          <a:p>
-            <a:pPr marL="0" marR="0" lvl="0" indent="0" algn="ctr" rtl="0">
-              <a:lnSpc>
-                <a:spcPct val="100000"/>
-              </a:lnSpc>
-              <a:spcBef>
-                <a:spcPts val="0"/>
-              </a:spcBef>
-              <a:spcAft>
-                <a:spcPts val="0"/>
-              </a:spcAft>
-              <a:buClr>
-                <a:srgbClr val="FFFFFF"/>
-              </a:buClr>
-              <a:buFont typeface="Helvetica Neue"/>
-              <a:buNone/>
-            </a:pPr>
-            <a:r>
-              <a:rPr lang="en-US" sz="4600" b="0" i="0" u="none" strike="noStrike" cap="none">
-                <a:solidFill>
-                  <a:srgbClr val="FFFFFF"/>
-                </a:solidFill>
-                <a:latin typeface="Helvetica Neue"/>
-                <a:ea typeface="Helvetica Neue"/>
-                <a:cs typeface="Helvetica Neue"/>
-                <a:sym typeface="Helvetica Neue"/>
-              </a:rPr>
-              <a:t>Conflict Resolving &amp; Pull Request</a:t>
-            </a:r>
-            <a:endParaRPr/>
-          </a:p>
-        </p:txBody>
-      </p:sp>
-    </p:spTree>
-  </p:cSld>
-  <p:clrMapOvr>
-    <a:masterClrMapping/>
-  </p:clrMapOvr>
-</p:sld>
-</file>
-
-<file path=ppt/slides/slide13.xml><?xml version="1.0" encoding="utf-8"?>
-<p:sld xmlns:a="http://schemas.openxmlformats.org/drawingml/2006/main" xmlns:r="http://schemas.openxmlformats.org/officeDocument/2006/relationships" xmlns:p="http://schemas.openxmlformats.org/presentationml/2006/main">
-  <p:cSld>
-    <p:spTree>
-      <p:nvGrpSpPr>
-        <p:cNvPr id="1" name="Shape 176"/>
-        <p:cNvGrpSpPr/>
-        <p:nvPr/>
-      </p:nvGrpSpPr>
-      <p:grpSpPr>
-        <a:xfrm>
-          <a:off x="0" y="0"/>
-          <a:ext cx="0" cy="0"/>
-          <a:chOff x="0" y="0"/>
-          <a:chExt cx="0" cy="0"/>
-        </a:xfrm>
-      </p:grpSpPr>
-      <p:sp>
-        <p:nvSpPr>
-          <p:cNvPr id="177" name="Google Shape;177;p31"/>
-          <p:cNvSpPr txBox="1">
-            <a:spLocks noGrp="1"/>
-          </p:cNvSpPr>
-          <p:nvPr>
-            <p:ph type="body" idx="2"/>
-          </p:nvPr>
-        </p:nvSpPr>
-        <p:spPr>
-          <a:xfrm>
-            <a:off x="1711021" y="1035446"/>
-            <a:ext cx="20828001" cy="838201"/>
-          </a:xfrm>
-          <a:prstGeom prst="rect">
-            <a:avLst/>
-          </a:prstGeom>
-          <a:noFill/>
-          <a:ln>
-            <a:noFill/>
-          </a:ln>
-        </p:spPr>
-        <p:txBody>
-          <a:bodyPr spcFirstLastPara="1" wrap="square" lIns="50800" tIns="50800" rIns="50800" bIns="50800" anchor="ctr" anchorCtr="0">
-            <a:noAutofit/>
-          </a:bodyPr>
-          <a:lstStyle/>
-          <a:p>
-            <a:pPr marL="0" marR="0" lvl="0" indent="0" algn="l" rtl="0">
-              <a:lnSpc>
-                <a:spcPct val="100000"/>
-              </a:lnSpc>
-              <a:spcBef>
-                <a:spcPts val="0"/>
-              </a:spcBef>
-              <a:spcAft>
-                <a:spcPts val="0"/>
-              </a:spcAft>
-              <a:buClr>
-                <a:srgbClr val="0747A6"/>
-              </a:buClr>
-              <a:buFont typeface="Helvetica Neue"/>
-              <a:buNone/>
-            </a:pPr>
-            <a:r>
-              <a:rPr lang="en-US" sz="4800" b="1" i="0" u="none" strike="noStrike" cap="none">
-                <a:solidFill>
-                  <a:srgbClr val="0747A6"/>
-                </a:solidFill>
-                <a:latin typeface="Helvetica Neue"/>
-                <a:ea typeface="Helvetica Neue"/>
-                <a:cs typeface="Helvetica Neue"/>
-                <a:sym typeface="Helvetica Neue"/>
-              </a:rPr>
-              <a:t>PULL REQUEST</a:t>
-            </a:r>
-            <a:endParaRPr/>
-          </a:p>
-        </p:txBody>
-      </p:sp>
-      <p:sp>
-        <p:nvSpPr>
-          <p:cNvPr id="178" name="Google Shape;178;p31"/>
-          <p:cNvSpPr/>
-          <p:nvPr/>
-        </p:nvSpPr>
-        <p:spPr>
-          <a:xfrm>
-            <a:off x="1711021" y="3306937"/>
-            <a:ext cx="20828000" cy="2311401"/>
-          </a:xfrm>
-          <a:prstGeom prst="rect">
-            <a:avLst/>
-          </a:prstGeom>
-          <a:noFill/>
-          <a:ln>
-            <a:noFill/>
-          </a:ln>
-        </p:spPr>
-        <p:txBody>
-          <a:bodyPr spcFirstLastPara="1" wrap="square" lIns="50800" tIns="50800" rIns="50800" bIns="50800" anchor="t" anchorCtr="0">
-            <a:noAutofit/>
-          </a:bodyPr>
-          <a:lstStyle/>
-          <a:p>
-            <a:pPr marL="635000" marR="0" lvl="0" indent="-635000" algn="l" rtl="0">
-              <a:lnSpc>
-                <a:spcPct val="100000"/>
-              </a:lnSpc>
-              <a:spcBef>
-                <a:spcPts val="0"/>
-              </a:spcBef>
-              <a:spcAft>
-                <a:spcPts val="0"/>
-              </a:spcAft>
-              <a:buClr>
-                <a:srgbClr val="253858"/>
-              </a:buClr>
-              <a:buSzPts val="6000"/>
-              <a:buFont typeface="Helvetica Neue"/>
-              <a:buChar char="•"/>
-            </a:pPr>
-            <a:r>
-              <a:rPr lang="en-US" sz="4800" b="0" i="0" u="none" strike="noStrike" cap="none">
-                <a:solidFill>
-                  <a:srgbClr val="253858"/>
-                </a:solidFill>
-                <a:latin typeface="Helvetica Neue"/>
-                <a:ea typeface="Helvetica Neue"/>
-                <a:cs typeface="Helvetica Neue"/>
-                <a:sym typeface="Helvetica Neue"/>
-              </a:rPr>
-              <a:t>Đơn giản chỉ là: Ê code nè, merge giùm đi!</a:t>
-            </a:r>
-            <a:endParaRPr/>
-          </a:p>
-          <a:p>
-            <a:pPr marL="635000" marR="0" lvl="0" indent="-635000" algn="l" rtl="0">
-              <a:lnSpc>
-                <a:spcPct val="100000"/>
-              </a:lnSpc>
-              <a:spcBef>
-                <a:spcPts val="0"/>
-              </a:spcBef>
-              <a:spcAft>
-                <a:spcPts val="0"/>
-              </a:spcAft>
-              <a:buClr>
-                <a:srgbClr val="253858"/>
-              </a:buClr>
-              <a:buSzPts val="6000"/>
-              <a:buFont typeface="Helvetica Neue"/>
-              <a:buChar char="•"/>
-            </a:pPr>
-            <a:r>
-              <a:rPr lang="en-US" sz="4800" b="0" i="0" u="none" strike="noStrike" cap="none">
-                <a:solidFill>
-                  <a:srgbClr val="253858"/>
-                </a:solidFill>
-                <a:latin typeface="Helvetica Neue"/>
-                <a:ea typeface="Helvetica Neue"/>
-                <a:cs typeface="Helvetica Neue"/>
-                <a:sym typeface="Helvetica Neue"/>
-              </a:rPr>
-              <a:t>Giúp commit ngắn gọn hơn</a:t>
-            </a:r>
-            <a:endParaRPr/>
-          </a:p>
-          <a:p>
-            <a:pPr marL="635000" marR="0" lvl="0" indent="-635000" algn="l" rtl="0">
-              <a:lnSpc>
-                <a:spcPct val="100000"/>
-              </a:lnSpc>
-              <a:spcBef>
-                <a:spcPts val="0"/>
-              </a:spcBef>
-              <a:spcAft>
-                <a:spcPts val="0"/>
-              </a:spcAft>
-              <a:buClr>
-                <a:srgbClr val="253858"/>
-              </a:buClr>
-              <a:buSzPts val="6000"/>
-              <a:buFont typeface="Helvetica Neue"/>
-              <a:buChar char="•"/>
-            </a:pPr>
-            <a:r>
-              <a:rPr lang="en-US" sz="4800" b="0" i="0" u="none" strike="noStrike" cap="none">
-                <a:solidFill>
-                  <a:srgbClr val="253858"/>
-                </a:solidFill>
-                <a:latin typeface="Helvetica Neue"/>
-                <a:ea typeface="Helvetica Neue"/>
-                <a:cs typeface="Helvetica Neue"/>
-                <a:sym typeface="Helvetica Neue"/>
-              </a:rPr>
-              <a:t>Hỗ trợ code review, ngăn code ẩu</a:t>
-            </a:r>
-            <a:endParaRPr/>
-          </a:p>
-        </p:txBody>
-      </p:sp>
-      <p:pic>
-        <p:nvPicPr>
-          <p:cNvPr id="179" name="Google Shape;179;p31" descr="pasted-image.tiff"/>
-          <p:cNvPicPr preferRelativeResize="0"/>
-          <p:nvPr/>
-        </p:nvPicPr>
-        <p:blipFill rotWithShape="1">
-          <a:blip r:embed="rId3">
-            <a:alphaModFix/>
-          </a:blip>
-          <a:srcRect/>
-          <a:stretch/>
-        </p:blipFill>
-        <p:spPr>
-          <a:xfrm>
-            <a:off x="12371875" y="6329557"/>
-            <a:ext cx="11396820" cy="6751443"/>
-          </a:xfrm>
-          <a:prstGeom prst="rect">
-            <a:avLst/>
-          </a:prstGeom>
-          <a:noFill/>
-          <a:ln>
-            <a:noFill/>
-          </a:ln>
-        </p:spPr>
-      </p:pic>
-    </p:spTree>
-  </p:cSld>
-  <p:clrMapOvr>
-    <a:masterClrMapping/>
-  </p:clrMapOvr>
-</p:sld>
-</file>
-
 <file path=ppt/slides/slide2.xml><?xml version="1.0" encoding="utf-8"?>
 <p:sld xmlns:a="http://schemas.openxmlformats.org/drawingml/2006/main" xmlns:r="http://schemas.openxmlformats.org/officeDocument/2006/relationships" xmlns:p="http://schemas.openxmlformats.org/presentationml/2006/main">
   <p:cSld>
@@ -13771,7 +13179,7 @@
         </p:nvSpPr>
         <p:spPr>
           <a:xfrm>
-            <a:off x="1711025" y="3306926"/>
+            <a:off x="1066800" y="2438400"/>
             <a:ext cx="20828100" cy="7974900"/>
           </a:xfrm>
           <a:prstGeom prst="rect">
@@ -13899,10 +13307,10 @@
                 <a:cs typeface="Helvetica Neue"/>
                 <a:sym typeface="Helvetica Neue"/>
               </a:rPr>
-              <a:t> Version Control, </a:t>
-            </a:r>
-            <a:r>
-              <a:rPr lang="en-US" sz="4800" b="0" i="0" u="none" strike="noStrike" cap="none" dirty="0" err="1">
+              <a:t> </a:t>
+            </a:r>
+            <a:r>
+              <a:rPr lang="en-US" sz="4800" b="0" i="0" u="none" strike="noStrike" cap="none" dirty="0" err="1" smtClean="0">
                 <a:solidFill>
                   <a:srgbClr val="253858"/>
                 </a:solidFill>
@@ -13914,6 +13322,18 @@
               <a:t>Git</a:t>
             </a:r>
             <a:r>
+              <a:rPr lang="en-US" sz="4800" b="0" i="0" u="none" strike="noStrike" cap="none" dirty="0" smtClean="0">
+                <a:solidFill>
+                  <a:srgbClr val="253858"/>
+                </a:solidFill>
+                <a:latin typeface="Helvetica Neue"/>
+                <a:ea typeface="Helvetica Neue"/>
+                <a:cs typeface="Helvetica Neue"/>
+                <a:sym typeface="Helvetica Neue"/>
+              </a:rPr>
+              <a:t> </a:t>
+            </a:r>
+            <a:r>
               <a:rPr lang="en-US" sz="4800" b="0" i="0" u="none" strike="noStrike" cap="none" dirty="0">
                 <a:solidFill>
                   <a:srgbClr val="253858"/>
@@ -13923,7 +13343,7 @@
                 <a:cs typeface="Helvetica Neue"/>
                 <a:sym typeface="Helvetica Neue"/>
               </a:rPr>
-              <a:t> &amp; </a:t>
+              <a:t>&amp; </a:t>
             </a:r>
             <a:r>
               <a:rPr lang="en-US" sz="4800" b="0" i="0" u="none" strike="noStrike" cap="none" dirty="0" err="1">
@@ -15355,35 +14775,21 @@
                   <a:srgbClr val="253858"/>
                 </a:solidFill>
               </a:rPr>
-              <a:t>iết ai là người tác động thai đổi và dự án.</a:t>
-            </a:r>
-          </a:p>
-          <a:p>
-            <a:pPr marL="635000" marR="0" lvl="0" indent="-635000" algn="l" rtl="0">
-              <a:lnSpc>
-                <a:spcPct val="100000"/>
-              </a:lnSpc>
-              <a:spcBef>
-                <a:spcPts val="0"/>
-              </a:spcBef>
-              <a:spcAft>
-                <a:spcPts val="0"/>
-              </a:spcAft>
-              <a:buClr>
+              <a:t>iết ai là người tác động thai đổi và dự án</a:t>
+            </a:r>
+            <a:r>
+              <a:rPr lang="vi-VN" dirty="0" smtClean="0">
+                <a:solidFill>
+                  <a:srgbClr val="253858"/>
+                </a:solidFill>
+              </a:rPr>
+              <a:t>.</a:t>
+            </a:r>
+            <a:endParaRPr lang="vi-VN" dirty="0" smtClean="0">
+              <a:solidFill>
                 <a:srgbClr val="253858"/>
-              </a:buClr>
-              <a:buSzPts val="6000"/>
-              <a:buFont typeface="Helvetica Neue"/>
-              <a:buChar char="•"/>
-            </a:pPr>
-            <a:r>
-              <a:rPr lang="vi-VN" dirty="0" smtClean="0">
-                <a:solidFill>
-                  <a:srgbClr val="253858"/>
-                </a:solidFill>
-              </a:rPr>
-              <a:t>Mà git là một trong những hệ thống Version Contronl phổ biết nhất hiện nay</a:t>
-            </a:r>
+              </a:solidFill>
+            </a:endParaRPr>
           </a:p>
           <a:p>
             <a:pPr marL="635000" marR="0" lvl="0" indent="-635000" algn="l" rtl="0">
@@ -15503,11 +14909,15 @@
               <a:buNone/>
             </a:pPr>
             <a:r>
-              <a:rPr lang="en-US" dirty="0"/>
-              <a:t>SOURCE CONTROL/</a:t>
-            </a:r>
-            <a:r>
-              <a:rPr lang="en-US" sz="4800" b="1" i="0" u="none" strike="noStrike" cap="none" dirty="0">
+              <a:rPr lang="en-US" dirty="0" err="1" smtClean="0"/>
+              <a:t>Git</a:t>
+            </a:r>
+            <a:r>
+              <a:rPr lang="en-US" dirty="0" smtClean="0"/>
+              <a:t> </a:t>
+            </a:r>
+            <a:r>
+              <a:rPr lang="en-US" sz="4800" b="1" i="0" u="none" strike="noStrike" cap="none" dirty="0" smtClean="0">
                 <a:solidFill>
                   <a:srgbClr val="0747A6"/>
                 </a:solidFill>
@@ -15516,7 +14926,7 @@
                 <a:cs typeface="Helvetica Neue"/>
                 <a:sym typeface="Helvetica Neue"/>
               </a:rPr>
-              <a:t>VERSION CONTROL LÀ </a:t>
+              <a:t>LÀ </a:t>
             </a:r>
             <a:r>
               <a:rPr lang="en-US" sz="4800" b="1" i="0" u="none" strike="noStrike" cap="none" dirty="0" smtClean="0">
@@ -15782,8 +15192,21 @@
                   <a:srgbClr val="253858"/>
                 </a:solidFill>
               </a:rPr>
-              <a:t>là nền tản quản lý mã nguồn trực tuyến</a:t>
-            </a:r>
+              <a:t>là nền tản quản lý mã nguồn trực </a:t>
+            </a:r>
+            <a:r>
+              <a:rPr lang="vi-VN" dirty="0" smtClean="0">
+                <a:solidFill>
+                  <a:srgbClr val="253858"/>
+                </a:solidFill>
+              </a:rPr>
+              <a:t>tuyến,Dựa trên Git</a:t>
+            </a:r>
+            <a:endParaRPr lang="vi-VN" dirty="0" smtClean="0">
+              <a:solidFill>
+                <a:srgbClr val="253858"/>
+              </a:solidFill>
+            </a:endParaRPr>
           </a:p>
           <a:p>
             <a:pPr marL="635000" lvl="0" indent="-635000" algn="l" rtl="0">
@@ -15870,7 +15293,23 @@
                   <a:srgbClr val="253858"/>
                 </a:solidFill>
               </a:rPr>
-              <a:t>ữ mã nguồn trực tuyến ,hổ trợ cộng tác giúp làm việc nhóm lớn với nhiều công cụ hổ trợ.</a:t>
+              <a:t>ữ mã nguồn trực tuyến ,hổ trợ </a:t>
+            </a:r>
+            <a:r>
+              <a:rPr lang="vi-VN" dirty="0" smtClean="0">
+                <a:solidFill>
+                  <a:srgbClr val="253858"/>
+                </a:solidFill>
+              </a:rPr>
+              <a:t>làm </a:t>
+            </a:r>
+            <a:r>
+              <a:rPr lang="vi-VN" dirty="0" smtClean="0">
+                <a:solidFill>
+                  <a:srgbClr val="253858"/>
+                </a:solidFill>
+              </a:rPr>
+              <a:t>việc nhóm lớn với nhiều công cụ hổ trợ.</a:t>
             </a:r>
             <a:endParaRPr lang="vi-VN" dirty="0">
               <a:solidFill>
@@ -15899,8 +15338,21 @@
                   <a:srgbClr val="253858"/>
                 </a:solidFill>
               </a:rPr>
-              <a:t>Có thể tạo Repository công cộng hoặc online</a:t>
-            </a:r>
+              <a:t>Có thể tạo Repository công cộng hoặc </a:t>
+            </a:r>
+            <a:r>
+              <a:rPr lang="vi-VN" dirty="0" smtClean="0">
+                <a:solidFill>
+                  <a:srgbClr val="253858"/>
+                </a:solidFill>
+              </a:rPr>
+              <a:t>riêng tư</a:t>
+            </a:r>
+            <a:endParaRPr lang="vi-VN" dirty="0" smtClean="0">
+              <a:solidFill>
+                <a:srgbClr val="253858"/>
+              </a:solidFill>
+            </a:endParaRPr>
           </a:p>
         </p:txBody>
       </p:sp>
@@ -16672,7 +16124,19 @@
                 <a:cs typeface="Helvetica Neue"/>
                 <a:sym typeface="Helvetica Neue"/>
               </a:rPr>
-              <a:t> commit</a:t>
+              <a:t> </a:t>
+            </a:r>
+            <a:r>
+              <a:rPr lang="en-US" sz="4800" b="0" i="0" u="none" strike="noStrike" cap="none" dirty="0" smtClean="0">
+                <a:solidFill>
+                  <a:srgbClr val="253858"/>
+                </a:solidFill>
+                <a:latin typeface="Helvetica Neue"/>
+                <a:ea typeface="Helvetica Neue"/>
+                <a:cs typeface="Helvetica Neue"/>
+                <a:sym typeface="Helvetica Neue"/>
+              </a:rPr>
+              <a:t>commit –m “”</a:t>
             </a:r>
             <a:endParaRPr dirty="0"/>
           </a:p>

</xml_diff>

<commit_message>
Revert "thay doi du an lan thu 1"
This reverts commit 01e1344b0ce52786261892b93a35f24ef1938e36.
</commit_message>
<xml_diff>
--- a/Git-presentation-16072017.pptx
+++ b/Git-presentation-16072017.pptx
@@ -5,7 +5,7 @@
     <p:sldMasterId id="2147483662" r:id="rId1"/>
   </p:sldMasterIdLst>
   <p:notesMasterIdLst>
-    <p:notesMasterId r:id="rId13"/>
+    <p:notesMasterId r:id="rId15"/>
   </p:notesMasterIdLst>
   <p:sldIdLst>
     <p:sldId id="256" r:id="rId2"/>
@@ -19,37 +19,39 @@
     <p:sldId id="266" r:id="rId10"/>
     <p:sldId id="268" r:id="rId11"/>
     <p:sldId id="269" r:id="rId12"/>
+    <p:sldId id="270" r:id="rId13"/>
+    <p:sldId id="271" r:id="rId14"/>
   </p:sldIdLst>
   <p:sldSz cx="24384000" cy="13716000"/>
   <p:notesSz cx="6858000" cy="9144000"/>
   <p:embeddedFontLst>
     <p:embeddedFont>
-      <p:font typeface="Roboto" panose="020B0604020202020204" charset="0"/>
-      <p:regular r:id="rId14"/>
-      <p:bold r:id="rId15"/>
-      <p:italic r:id="rId16"/>
-      <p:boldItalic r:id="rId17"/>
+      <p:font typeface="Helvetica Neue" panose="020B0604020202020204" charset="0"/>
+      <p:regular r:id="rId16"/>
+      <p:bold r:id="rId17"/>
+      <p:italic r:id="rId18"/>
+      <p:boldItalic r:id="rId19"/>
     </p:embeddedFont>
     <p:embeddedFont>
       <p:font typeface="Merriweather" panose="020B0604020202020204" charset="-93"/>
-      <p:regular r:id="rId18"/>
-      <p:bold r:id="rId19"/>
-      <p:italic r:id="rId20"/>
-      <p:boldItalic r:id="rId21"/>
-    </p:embeddedFont>
-    <p:embeddedFont>
-      <p:font typeface="Helvetica Neue" panose="020B0604020202020204" charset="0"/>
-      <p:regular r:id="rId22"/>
-      <p:bold r:id="rId23"/>
-      <p:italic r:id="rId24"/>
-      <p:boldItalic r:id="rId25"/>
+      <p:regular r:id="rId20"/>
+      <p:bold r:id="rId21"/>
+      <p:italic r:id="rId22"/>
+      <p:boldItalic r:id="rId23"/>
     </p:embeddedFont>
     <p:embeddedFont>
       <p:font typeface="Helvetica Neue Light" panose="020B0604020202020204" charset="0"/>
-      <p:regular r:id="rId26"/>
-      <p:bold r:id="rId27"/>
-      <p:italic r:id="rId28"/>
-      <p:boldItalic r:id="rId29"/>
+      <p:regular r:id="rId24"/>
+      <p:bold r:id="rId25"/>
+      <p:italic r:id="rId26"/>
+      <p:boldItalic r:id="rId27"/>
+    </p:embeddedFont>
+    <p:embeddedFont>
+      <p:font typeface="Roboto" panose="020B0604020202020204" charset="0"/>
+      <p:regular r:id="rId28"/>
+      <p:bold r:id="rId29"/>
+      <p:italic r:id="rId30"/>
+      <p:boldItalic r:id="rId31"/>
     </p:embeddedFont>
   </p:embeddedFontLst>
   <p:defaultTextStyle>
@@ -1062,6 +1064,214 @@
       <p:sp>
         <p:nvSpPr>
           <p:cNvPr id="162" name="Google Shape;162;p20:notes"/>
+          <p:cNvSpPr>
+            <a:spLocks noGrp="1" noRot="1" noChangeAspect="1"/>
+          </p:cNvSpPr>
+          <p:nvPr>
+            <p:ph type="sldImg" idx="2"/>
+          </p:nvPr>
+        </p:nvSpPr>
+        <p:spPr>
+          <a:xfrm>
+            <a:off x="381000" y="685800"/>
+            <a:ext cx="6096000" cy="3429000"/>
+          </a:xfrm>
+          <a:custGeom>
+            <a:avLst/>
+            <a:gdLst/>
+            <a:ahLst/>
+            <a:cxnLst/>
+            <a:rect l="l" t="t" r="r" b="b"/>
+            <a:pathLst>
+              <a:path w="120000" h="120000" extrusionOk="0">
+                <a:moveTo>
+                  <a:pt x="0" y="0"/>
+                </a:moveTo>
+                <a:lnTo>
+                  <a:pt x="120000" y="0"/>
+                </a:lnTo>
+                <a:lnTo>
+                  <a:pt x="120000" y="120000"/>
+                </a:lnTo>
+                <a:lnTo>
+                  <a:pt x="0" y="120000"/>
+                </a:lnTo>
+                <a:close/>
+              </a:path>
+            </a:pathLst>
+          </a:custGeom>
+        </p:spPr>
+      </p:sp>
+    </p:spTree>
+  </p:cSld>
+  <p:clrMapOvr>
+    <a:masterClrMapping/>
+  </p:clrMapOvr>
+</p:notes>
+</file>
+
+<file path=ppt/notesSlides/notesSlide12.xml><?xml version="1.0" encoding="utf-8"?>
+<p:notes xmlns:a="http://schemas.openxmlformats.org/drawingml/2006/main" xmlns:r="http://schemas.openxmlformats.org/officeDocument/2006/relationships" xmlns:p="http://schemas.openxmlformats.org/presentationml/2006/main" showMasterSp="0" showMasterPhAnim="0">
+  <p:cSld>
+    <p:spTree>
+      <p:nvGrpSpPr>
+        <p:cNvPr id="1" name="Shape 167"/>
+        <p:cNvGrpSpPr/>
+        <p:nvPr/>
+      </p:nvGrpSpPr>
+      <p:grpSpPr>
+        <a:xfrm>
+          <a:off x="0" y="0"/>
+          <a:ext cx="0" cy="0"/>
+          <a:chOff x="0" y="0"/>
+          <a:chExt cx="0" cy="0"/>
+        </a:xfrm>
+      </p:grpSpPr>
+      <p:sp>
+        <p:nvSpPr>
+          <p:cNvPr id="168" name="Google Shape;168;p21:notes"/>
+          <p:cNvSpPr txBox="1">
+            <a:spLocks noGrp="1"/>
+          </p:cNvSpPr>
+          <p:nvPr>
+            <p:ph type="body" idx="1"/>
+          </p:nvPr>
+        </p:nvSpPr>
+        <p:spPr>
+          <a:xfrm>
+            <a:off x="914400" y="4343400"/>
+            <a:ext cx="5029200" cy="4114800"/>
+          </a:xfrm>
+          <a:prstGeom prst="rect">
+            <a:avLst/>
+          </a:prstGeom>
+        </p:spPr>
+        <p:txBody>
+          <a:bodyPr spcFirstLastPara="1" wrap="square" lIns="91425" tIns="91425" rIns="91425" bIns="91425" anchor="t" anchorCtr="0">
+            <a:noAutofit/>
+          </a:bodyPr>
+          <a:lstStyle/>
+          <a:p>
+            <a:pPr marL="0" lvl="0" indent="0" algn="l" rtl="0">
+              <a:spcBef>
+                <a:spcPts val="0"/>
+              </a:spcBef>
+              <a:spcAft>
+                <a:spcPts val="0"/>
+              </a:spcAft>
+              <a:buNone/>
+            </a:pPr>
+            <a:endParaRPr/>
+          </a:p>
+        </p:txBody>
+      </p:sp>
+      <p:sp>
+        <p:nvSpPr>
+          <p:cNvPr id="169" name="Google Shape;169;p21:notes"/>
+          <p:cNvSpPr>
+            <a:spLocks noGrp="1" noRot="1" noChangeAspect="1"/>
+          </p:cNvSpPr>
+          <p:nvPr>
+            <p:ph type="sldImg" idx="2"/>
+          </p:nvPr>
+        </p:nvSpPr>
+        <p:spPr>
+          <a:xfrm>
+            <a:off x="381000" y="685800"/>
+            <a:ext cx="6096000" cy="3429000"/>
+          </a:xfrm>
+          <a:custGeom>
+            <a:avLst/>
+            <a:gdLst/>
+            <a:ahLst/>
+            <a:cxnLst/>
+            <a:rect l="l" t="t" r="r" b="b"/>
+            <a:pathLst>
+              <a:path w="120000" h="120000" extrusionOk="0">
+                <a:moveTo>
+                  <a:pt x="0" y="0"/>
+                </a:moveTo>
+                <a:lnTo>
+                  <a:pt x="120000" y="0"/>
+                </a:lnTo>
+                <a:lnTo>
+                  <a:pt x="120000" y="120000"/>
+                </a:lnTo>
+                <a:lnTo>
+                  <a:pt x="0" y="120000"/>
+                </a:lnTo>
+                <a:close/>
+              </a:path>
+            </a:pathLst>
+          </a:custGeom>
+        </p:spPr>
+      </p:sp>
+    </p:spTree>
+  </p:cSld>
+  <p:clrMapOvr>
+    <a:masterClrMapping/>
+  </p:clrMapOvr>
+</p:notes>
+</file>
+
+<file path=ppt/notesSlides/notesSlide13.xml><?xml version="1.0" encoding="utf-8"?>
+<p:notes xmlns:a="http://schemas.openxmlformats.org/drawingml/2006/main" xmlns:r="http://schemas.openxmlformats.org/officeDocument/2006/relationships" xmlns:p="http://schemas.openxmlformats.org/presentationml/2006/main" showMasterSp="0" showMasterPhAnim="0">
+  <p:cSld>
+    <p:spTree>
+      <p:nvGrpSpPr>
+        <p:cNvPr id="1" name="Shape 173"/>
+        <p:cNvGrpSpPr/>
+        <p:nvPr/>
+      </p:nvGrpSpPr>
+      <p:grpSpPr>
+        <a:xfrm>
+          <a:off x="0" y="0"/>
+          <a:ext cx="0" cy="0"/>
+          <a:chOff x="0" y="0"/>
+          <a:chExt cx="0" cy="0"/>
+        </a:xfrm>
+      </p:grpSpPr>
+      <p:sp>
+        <p:nvSpPr>
+          <p:cNvPr id="174" name="Google Shape;174;p22:notes"/>
+          <p:cNvSpPr txBox="1">
+            <a:spLocks noGrp="1"/>
+          </p:cNvSpPr>
+          <p:nvPr>
+            <p:ph type="body" idx="1"/>
+          </p:nvPr>
+        </p:nvSpPr>
+        <p:spPr>
+          <a:xfrm>
+            <a:off x="914400" y="4343400"/>
+            <a:ext cx="5029200" cy="4114800"/>
+          </a:xfrm>
+          <a:prstGeom prst="rect">
+            <a:avLst/>
+          </a:prstGeom>
+        </p:spPr>
+        <p:txBody>
+          <a:bodyPr spcFirstLastPara="1" wrap="square" lIns="91425" tIns="91425" rIns="91425" bIns="91425" anchor="t" anchorCtr="0">
+            <a:noAutofit/>
+          </a:bodyPr>
+          <a:lstStyle/>
+          <a:p>
+            <a:pPr marL="0" lvl="0" indent="0" algn="l" rtl="0">
+              <a:spcBef>
+                <a:spcPts val="0"/>
+              </a:spcBef>
+              <a:spcAft>
+                <a:spcPts val="0"/>
+              </a:spcAft>
+              <a:buNone/>
+            </a:pPr>
+            <a:endParaRPr/>
+          </a:p>
+        </p:txBody>
+      </p:sp>
+      <p:sp>
+        <p:nvSpPr>
+          <p:cNvPr id="175" name="Google Shape;175;p22:notes"/>
           <p:cNvSpPr>
             <a:spLocks noGrp="1" noRot="1" noChangeAspect="1"/>
           </p:cNvSpPr>
@@ -13150,6 +13360,388 @@
 </p:sld>
 </file>
 
+<file path=ppt/slides/slide12.xml><?xml version="1.0" encoding="utf-8"?>
+<p:sld xmlns:a="http://schemas.openxmlformats.org/drawingml/2006/main" xmlns:r="http://schemas.openxmlformats.org/officeDocument/2006/relationships" xmlns:p="http://schemas.openxmlformats.org/presentationml/2006/main">
+  <p:cSld>
+    <p:spTree>
+      <p:nvGrpSpPr>
+        <p:cNvPr id="1" name="Shape 170"/>
+        <p:cNvGrpSpPr/>
+        <p:nvPr/>
+      </p:nvGrpSpPr>
+      <p:grpSpPr>
+        <a:xfrm>
+          <a:off x="0" y="0"/>
+          <a:ext cx="0" cy="0"/>
+          <a:chOff x="0" y="0"/>
+          <a:chExt cx="0" cy="0"/>
+        </a:xfrm>
+      </p:grpSpPr>
+      <p:sp>
+        <p:nvSpPr>
+          <p:cNvPr id="171" name="Google Shape;171;p30"/>
+          <p:cNvSpPr txBox="1">
+            <a:spLocks noGrp="1"/>
+          </p:cNvSpPr>
+          <p:nvPr>
+            <p:ph type="body" idx="1"/>
+          </p:nvPr>
+        </p:nvSpPr>
+        <p:spPr>
+          <a:xfrm>
+            <a:off x="4381243" y="5407024"/>
+            <a:ext cx="15621514" cy="1879601"/>
+          </a:xfrm>
+          <a:prstGeom prst="rect">
+            <a:avLst/>
+          </a:prstGeom>
+          <a:noFill/>
+          <a:ln>
+            <a:noFill/>
+          </a:ln>
+        </p:spPr>
+        <p:txBody>
+          <a:bodyPr spcFirstLastPara="1" wrap="square" lIns="38100" tIns="38100" rIns="38100" bIns="38100" anchor="b" anchorCtr="0">
+            <a:noAutofit/>
+          </a:bodyPr>
+          <a:lstStyle/>
+          <a:p>
+            <a:pPr marL="0" marR="0" lvl="0" indent="0" algn="ctr" rtl="0">
+              <a:lnSpc>
+                <a:spcPct val="100000"/>
+              </a:lnSpc>
+              <a:spcBef>
+                <a:spcPts val="0"/>
+              </a:spcBef>
+              <a:spcAft>
+                <a:spcPts val="0"/>
+              </a:spcAft>
+              <a:buClr>
+                <a:srgbClr val="FFFFFF"/>
+              </a:buClr>
+              <a:buFont typeface="Helvetica Neue"/>
+              <a:buNone/>
+            </a:pPr>
+            <a:r>
+              <a:rPr lang="en-US" sz="11800" b="1" i="0" u="none" strike="noStrike" cap="none">
+                <a:solidFill>
+                  <a:srgbClr val="FFFFFF"/>
+                </a:solidFill>
+                <a:latin typeface="Helvetica Neue"/>
+                <a:ea typeface="Helvetica Neue"/>
+                <a:cs typeface="Helvetica Neue"/>
+                <a:sym typeface="Helvetica Neue"/>
+              </a:rPr>
+              <a:t>Nâng cao</a:t>
+            </a:r>
+            <a:endParaRPr/>
+          </a:p>
+        </p:txBody>
+      </p:sp>
+      <p:sp>
+        <p:nvSpPr>
+          <p:cNvPr id="172" name="Google Shape;172;p30"/>
+          <p:cNvSpPr txBox="1">
+            <a:spLocks noGrp="1"/>
+          </p:cNvSpPr>
+          <p:nvPr>
+            <p:ph type="body" idx="2"/>
+          </p:nvPr>
+        </p:nvSpPr>
+        <p:spPr>
+          <a:xfrm>
+            <a:off x="4381243" y="7241381"/>
+            <a:ext cx="15621514" cy="774701"/>
+          </a:xfrm>
+          <a:prstGeom prst="rect">
+            <a:avLst/>
+          </a:prstGeom>
+          <a:noFill/>
+          <a:ln>
+            <a:noFill/>
+          </a:ln>
+        </p:spPr>
+        <p:txBody>
+          <a:bodyPr spcFirstLastPara="1" wrap="square" lIns="38100" tIns="38100" rIns="38100" bIns="38100" anchor="t" anchorCtr="0">
+            <a:noAutofit/>
+          </a:bodyPr>
+          <a:lstStyle/>
+          <a:p>
+            <a:pPr marL="0" marR="0" lvl="0" indent="0" algn="ctr" rtl="0">
+              <a:lnSpc>
+                <a:spcPct val="100000"/>
+              </a:lnSpc>
+              <a:spcBef>
+                <a:spcPts val="0"/>
+              </a:spcBef>
+              <a:spcAft>
+                <a:spcPts val="0"/>
+              </a:spcAft>
+              <a:buClr>
+                <a:srgbClr val="FFFFFF"/>
+              </a:buClr>
+              <a:buFont typeface="Helvetica Neue"/>
+              <a:buNone/>
+            </a:pPr>
+            <a:r>
+              <a:rPr lang="en-US" sz="4600" b="0" i="0" u="none" strike="noStrike" cap="none">
+                <a:solidFill>
+                  <a:srgbClr val="FFFFFF"/>
+                </a:solidFill>
+                <a:latin typeface="Helvetica Neue"/>
+                <a:ea typeface="Helvetica Neue"/>
+                <a:cs typeface="Helvetica Neue"/>
+                <a:sym typeface="Helvetica Neue"/>
+              </a:rPr>
+              <a:t>Conflict Resolving &amp; Pull Request</a:t>
+            </a:r>
+            <a:endParaRPr/>
+          </a:p>
+        </p:txBody>
+      </p:sp>
+    </p:spTree>
+  </p:cSld>
+  <p:clrMapOvr>
+    <a:masterClrMapping/>
+  </p:clrMapOvr>
+</p:sld>
+</file>
+
+<file path=ppt/slides/slide13.xml><?xml version="1.0" encoding="utf-8"?>
+<p:sld xmlns:a="http://schemas.openxmlformats.org/drawingml/2006/main" xmlns:r="http://schemas.openxmlformats.org/officeDocument/2006/relationships" xmlns:p="http://schemas.openxmlformats.org/presentationml/2006/main">
+  <p:cSld>
+    <p:spTree>
+      <p:nvGrpSpPr>
+        <p:cNvPr id="1" name="Shape 176"/>
+        <p:cNvGrpSpPr/>
+        <p:nvPr/>
+      </p:nvGrpSpPr>
+      <p:grpSpPr>
+        <a:xfrm>
+          <a:off x="0" y="0"/>
+          <a:ext cx="0" cy="0"/>
+          <a:chOff x="0" y="0"/>
+          <a:chExt cx="0" cy="0"/>
+        </a:xfrm>
+      </p:grpSpPr>
+      <p:sp>
+        <p:nvSpPr>
+          <p:cNvPr id="177" name="Google Shape;177;p31"/>
+          <p:cNvSpPr txBox="1">
+            <a:spLocks noGrp="1"/>
+          </p:cNvSpPr>
+          <p:nvPr>
+            <p:ph type="body" idx="2"/>
+          </p:nvPr>
+        </p:nvSpPr>
+        <p:spPr>
+          <a:xfrm>
+            <a:off x="1711021" y="1035446"/>
+            <a:ext cx="20828001" cy="838201"/>
+          </a:xfrm>
+          <a:prstGeom prst="rect">
+            <a:avLst/>
+          </a:prstGeom>
+          <a:noFill/>
+          <a:ln>
+            <a:noFill/>
+          </a:ln>
+        </p:spPr>
+        <p:txBody>
+          <a:bodyPr spcFirstLastPara="1" wrap="square" lIns="50800" tIns="50800" rIns="50800" bIns="50800" anchor="ctr" anchorCtr="0">
+            <a:noAutofit/>
+          </a:bodyPr>
+          <a:lstStyle/>
+          <a:p>
+            <a:pPr marL="0" marR="0" lvl="0" indent="0" algn="l" rtl="0">
+              <a:lnSpc>
+                <a:spcPct val="100000"/>
+              </a:lnSpc>
+              <a:spcBef>
+                <a:spcPts val="0"/>
+              </a:spcBef>
+              <a:spcAft>
+                <a:spcPts val="0"/>
+              </a:spcAft>
+              <a:buClr>
+                <a:srgbClr val="0747A6"/>
+              </a:buClr>
+              <a:buFont typeface="Helvetica Neue"/>
+              <a:buNone/>
+            </a:pPr>
+            <a:r>
+              <a:rPr lang="en-US" sz="4800" b="1" i="0" u="none" strike="noStrike" cap="none">
+                <a:solidFill>
+                  <a:srgbClr val="0747A6"/>
+                </a:solidFill>
+                <a:latin typeface="Helvetica Neue"/>
+                <a:ea typeface="Helvetica Neue"/>
+                <a:cs typeface="Helvetica Neue"/>
+                <a:sym typeface="Helvetica Neue"/>
+              </a:rPr>
+              <a:t>PULL REQUEST</a:t>
+            </a:r>
+            <a:endParaRPr/>
+          </a:p>
+        </p:txBody>
+      </p:sp>
+      <p:sp>
+        <p:nvSpPr>
+          <p:cNvPr id="178" name="Google Shape;178;p31"/>
+          <p:cNvSpPr/>
+          <p:nvPr/>
+        </p:nvSpPr>
+        <p:spPr>
+          <a:xfrm>
+            <a:off x="1711021" y="3306937"/>
+            <a:ext cx="20828000" cy="2311401"/>
+          </a:xfrm>
+          <a:prstGeom prst="rect">
+            <a:avLst/>
+          </a:prstGeom>
+          <a:noFill/>
+          <a:ln>
+            <a:noFill/>
+          </a:ln>
+        </p:spPr>
+        <p:txBody>
+          <a:bodyPr spcFirstLastPara="1" wrap="square" lIns="50800" tIns="50800" rIns="50800" bIns="50800" anchor="t" anchorCtr="0">
+            <a:noAutofit/>
+          </a:bodyPr>
+          <a:lstStyle/>
+          <a:p>
+            <a:pPr marL="635000" marR="0" lvl="0" indent="-635000" algn="l" rtl="0">
+              <a:lnSpc>
+                <a:spcPct val="100000"/>
+              </a:lnSpc>
+              <a:spcBef>
+                <a:spcPts val="0"/>
+              </a:spcBef>
+              <a:spcAft>
+                <a:spcPts val="0"/>
+              </a:spcAft>
+              <a:buClr>
+                <a:srgbClr val="253858"/>
+              </a:buClr>
+              <a:buSzPts val="6000"/>
+              <a:buFont typeface="Helvetica Neue"/>
+              <a:buChar char="•"/>
+            </a:pPr>
+            <a:r>
+              <a:rPr lang="en-US" sz="4800" b="0" i="0" u="none" strike="noStrike" cap="none">
+                <a:solidFill>
+                  <a:srgbClr val="253858"/>
+                </a:solidFill>
+                <a:latin typeface="Helvetica Neue"/>
+                <a:ea typeface="Helvetica Neue"/>
+                <a:cs typeface="Helvetica Neue"/>
+                <a:sym typeface="Helvetica Neue"/>
+              </a:rPr>
+              <a:t>Đơn giản chỉ là: Ê code nè, merge giùm đi!</a:t>
+            </a:r>
+            <a:endParaRPr/>
+          </a:p>
+          <a:p>
+            <a:pPr marL="635000" marR="0" lvl="0" indent="-635000" algn="l" rtl="0">
+              <a:lnSpc>
+                <a:spcPct val="100000"/>
+              </a:lnSpc>
+              <a:spcBef>
+                <a:spcPts val="0"/>
+              </a:spcBef>
+              <a:spcAft>
+                <a:spcPts val="0"/>
+              </a:spcAft>
+              <a:buClr>
+                <a:srgbClr val="253858"/>
+              </a:buClr>
+              <a:buSzPts val="6000"/>
+              <a:buFont typeface="Helvetica Neue"/>
+              <a:buChar char="•"/>
+            </a:pPr>
+            <a:r>
+              <a:rPr lang="en-US" sz="4800" b="0" i="0" u="none" strike="noStrike" cap="none">
+                <a:solidFill>
+                  <a:srgbClr val="253858"/>
+                </a:solidFill>
+                <a:latin typeface="Helvetica Neue"/>
+                <a:ea typeface="Helvetica Neue"/>
+                <a:cs typeface="Helvetica Neue"/>
+                <a:sym typeface="Helvetica Neue"/>
+              </a:rPr>
+              <a:t>Giúp commit ngắn gọn hơn</a:t>
+            </a:r>
+            <a:endParaRPr/>
+          </a:p>
+          <a:p>
+            <a:pPr marL="635000" marR="0" lvl="0" indent="-635000" algn="l" rtl="0">
+              <a:lnSpc>
+                <a:spcPct val="100000"/>
+              </a:lnSpc>
+              <a:spcBef>
+                <a:spcPts val="0"/>
+              </a:spcBef>
+              <a:spcAft>
+                <a:spcPts val="0"/>
+              </a:spcAft>
+              <a:buClr>
+                <a:srgbClr val="253858"/>
+              </a:buClr>
+              <a:buSzPts val="6000"/>
+              <a:buFont typeface="Helvetica Neue"/>
+              <a:buChar char="•"/>
+            </a:pPr>
+            <a:r>
+              <a:rPr lang="en-US" sz="4800" b="0" i="0" u="none" strike="noStrike" cap="none">
+                <a:solidFill>
+                  <a:srgbClr val="253858"/>
+                </a:solidFill>
+                <a:latin typeface="Helvetica Neue"/>
+                <a:ea typeface="Helvetica Neue"/>
+                <a:cs typeface="Helvetica Neue"/>
+                <a:sym typeface="Helvetica Neue"/>
+              </a:rPr>
+              <a:t>Hỗ trợ code review, ngăn code ẩu</a:t>
+            </a:r>
+            <a:endParaRPr/>
+          </a:p>
+        </p:txBody>
+      </p:sp>
+      <p:pic>
+        <p:nvPicPr>
+          <p:cNvPr id="179" name="Google Shape;179;p31" descr="pasted-image.tiff"/>
+          <p:cNvPicPr preferRelativeResize="0"/>
+          <p:nvPr/>
+        </p:nvPicPr>
+        <p:blipFill rotWithShape="1">
+          <a:blip r:embed="rId3">
+            <a:alphaModFix/>
+          </a:blip>
+          <a:srcRect/>
+          <a:stretch/>
+        </p:blipFill>
+        <p:spPr>
+          <a:xfrm>
+            <a:off x="12371875" y="6329557"/>
+            <a:ext cx="11396820" cy="6751443"/>
+          </a:xfrm>
+          <a:prstGeom prst="rect">
+            <a:avLst/>
+          </a:prstGeom>
+          <a:noFill/>
+          <a:ln>
+            <a:noFill/>
+          </a:ln>
+        </p:spPr>
+      </p:pic>
+    </p:spTree>
+  </p:cSld>
+  <p:clrMapOvr>
+    <a:masterClrMapping/>
+  </p:clrMapOvr>
+</p:sld>
+</file>
+
 <file path=ppt/slides/slide2.xml><?xml version="1.0" encoding="utf-8"?>
 <p:sld xmlns:a="http://schemas.openxmlformats.org/drawingml/2006/main" xmlns:r="http://schemas.openxmlformats.org/officeDocument/2006/relationships" xmlns:p="http://schemas.openxmlformats.org/presentationml/2006/main">
   <p:cSld>
@@ -13179,7 +13771,7 @@
         </p:nvSpPr>
         <p:spPr>
           <a:xfrm>
-            <a:off x="1066800" y="2438400"/>
+            <a:off x="1711025" y="3306926"/>
             <a:ext cx="20828100" cy="7974900"/>
           </a:xfrm>
           <a:prstGeom prst="rect">
@@ -13307,10 +13899,10 @@
                 <a:cs typeface="Helvetica Neue"/>
                 <a:sym typeface="Helvetica Neue"/>
               </a:rPr>
-              <a:t> </a:t>
+              <a:t> Version Control, </a:t>
             </a:r>
             <a:r>
-              <a:rPr lang="en-US" sz="4800" b="0" i="0" u="none" strike="noStrike" cap="none" dirty="0" err="1" smtClean="0">
+              <a:rPr lang="en-US" sz="4800" b="0" i="0" u="none" strike="noStrike" cap="none" dirty="0" err="1">
                 <a:solidFill>
                   <a:srgbClr val="253858"/>
                 </a:solidFill>
@@ -13322,7 +13914,7 @@
               <a:t>Git</a:t>
             </a:r>
             <a:r>
-              <a:rPr lang="en-US" sz="4800" b="0" i="0" u="none" strike="noStrike" cap="none" dirty="0" smtClean="0">
+              <a:rPr lang="en-US" sz="4800" b="0" i="0" u="none" strike="noStrike" cap="none" dirty="0">
                 <a:solidFill>
                   <a:srgbClr val="253858"/>
                 </a:solidFill>
@@ -13331,19 +13923,7 @@
                 <a:cs typeface="Helvetica Neue"/>
                 <a:sym typeface="Helvetica Neue"/>
               </a:rPr>
-              <a:t> </a:t>
-            </a:r>
-            <a:r>
-              <a:rPr lang="en-US" sz="4800" b="0" i="0" u="none" strike="noStrike" cap="none" dirty="0">
-                <a:solidFill>
-                  <a:srgbClr val="253858"/>
-                </a:solidFill>
-                <a:latin typeface="Helvetica Neue"/>
-                <a:ea typeface="Helvetica Neue"/>
-                <a:cs typeface="Helvetica Neue"/>
-                <a:sym typeface="Helvetica Neue"/>
-              </a:rPr>
-              <a:t>&amp; </a:t>
+              <a:t> &amp; </a:t>
             </a:r>
             <a:r>
               <a:rPr lang="en-US" sz="4800" b="0" i="0" u="none" strike="noStrike" cap="none" dirty="0" err="1">
@@ -14775,21 +15355,35 @@
                   <a:srgbClr val="253858"/>
                 </a:solidFill>
               </a:rPr>
-              <a:t>iết ai là người tác động thai đổi và dự án</a:t>
+              <a:t>iết ai là người tác động thai đổi và dự án.</a:t>
             </a:r>
+          </a:p>
+          <a:p>
+            <a:pPr marL="635000" marR="0" lvl="0" indent="-635000" algn="l" rtl="0">
+              <a:lnSpc>
+                <a:spcPct val="100000"/>
+              </a:lnSpc>
+              <a:spcBef>
+                <a:spcPts val="0"/>
+              </a:spcBef>
+              <a:spcAft>
+                <a:spcPts val="0"/>
+              </a:spcAft>
+              <a:buClr>
+                <a:srgbClr val="253858"/>
+              </a:buClr>
+              <a:buSzPts val="6000"/>
+              <a:buFont typeface="Helvetica Neue"/>
+              <a:buChar char="•"/>
+            </a:pPr>
             <a:r>
               <a:rPr lang="vi-VN" dirty="0" smtClean="0">
                 <a:solidFill>
                   <a:srgbClr val="253858"/>
                 </a:solidFill>
               </a:rPr>
-              <a:t>.</a:t>
+              <a:t>Mà git là một trong những hệ thống Version Contronl phổ biết nhất hiện nay</a:t>
             </a:r>
-            <a:endParaRPr lang="vi-VN" dirty="0" smtClean="0">
-              <a:solidFill>
-                <a:srgbClr val="253858"/>
-              </a:solidFill>
-            </a:endParaRPr>
           </a:p>
           <a:p>
             <a:pPr marL="635000" marR="0" lvl="0" indent="-635000" algn="l" rtl="0">
@@ -14909,15 +15503,11 @@
               <a:buNone/>
             </a:pPr>
             <a:r>
-              <a:rPr lang="en-US" dirty="0" err="1" smtClean="0"/>
-              <a:t>Git</a:t>
+              <a:rPr lang="en-US" dirty="0"/>
+              <a:t>SOURCE CONTROL/</a:t>
             </a:r>
             <a:r>
-              <a:rPr lang="en-US" dirty="0" smtClean="0"/>
-              <a:t> </a:t>
-            </a:r>
-            <a:r>
-              <a:rPr lang="en-US" sz="4800" b="1" i="0" u="none" strike="noStrike" cap="none" dirty="0" smtClean="0">
+              <a:rPr lang="en-US" sz="4800" b="1" i="0" u="none" strike="noStrike" cap="none" dirty="0">
                 <a:solidFill>
                   <a:srgbClr val="0747A6"/>
                 </a:solidFill>
@@ -14926,7 +15516,7 @@
                 <a:cs typeface="Helvetica Neue"/>
                 <a:sym typeface="Helvetica Neue"/>
               </a:rPr>
-              <a:t>LÀ </a:t>
+              <a:t>VERSION CONTROL LÀ </a:t>
             </a:r>
             <a:r>
               <a:rPr lang="en-US" sz="4800" b="1" i="0" u="none" strike="noStrike" cap="none" dirty="0" smtClean="0">
@@ -15192,21 +15782,8 @@
                   <a:srgbClr val="253858"/>
                 </a:solidFill>
               </a:rPr>
-              <a:t>là nền tản quản lý mã nguồn trực </a:t>
+              <a:t>là nền tản quản lý mã nguồn trực tuyến</a:t>
             </a:r>
-            <a:r>
-              <a:rPr lang="vi-VN" dirty="0" smtClean="0">
-                <a:solidFill>
-                  <a:srgbClr val="253858"/>
-                </a:solidFill>
-              </a:rPr>
-              <a:t>tuyến,Dựa trên Git</a:t>
-            </a:r>
-            <a:endParaRPr lang="vi-VN" dirty="0" smtClean="0">
-              <a:solidFill>
-                <a:srgbClr val="253858"/>
-              </a:solidFill>
-            </a:endParaRPr>
           </a:p>
           <a:p>
             <a:pPr marL="635000" lvl="0" indent="-635000" algn="l" rtl="0">
@@ -15293,23 +15870,7 @@
                   <a:srgbClr val="253858"/>
                 </a:solidFill>
               </a:rPr>
-              <a:t>ữ mã nguồn trực tuyến ,hổ trợ </a:t>
-            </a:r>
-            <a:r>
-              <a:rPr lang="vi-VN" dirty="0" smtClean="0">
-                <a:solidFill>
-                  <a:srgbClr val="253858"/>
-                </a:solidFill>
-              </a:rPr>
-              <a:t>làm </a:t>
-            </a:r>
-            <a:r>
-              <a:rPr lang="vi-VN" dirty="0" smtClean="0">
-                <a:solidFill>
-                  <a:srgbClr val="253858"/>
-                </a:solidFill>
-              </a:rPr>
-              <a:t>việc nhóm lớn với nhiều công cụ hổ trợ.</a:t>
+              <a:t>ữ mã nguồn trực tuyến ,hổ trợ cộng tác giúp làm việc nhóm lớn với nhiều công cụ hổ trợ.</a:t>
             </a:r>
             <a:endParaRPr lang="vi-VN" dirty="0">
               <a:solidFill>
@@ -15338,21 +15899,8 @@
                   <a:srgbClr val="253858"/>
                 </a:solidFill>
               </a:rPr>
-              <a:t>Có thể tạo Repository công cộng hoặc </a:t>
+              <a:t>Có thể tạo Repository công cộng hoặc online</a:t>
             </a:r>
-            <a:r>
-              <a:rPr lang="vi-VN" dirty="0" smtClean="0">
-                <a:solidFill>
-                  <a:srgbClr val="253858"/>
-                </a:solidFill>
-              </a:rPr>
-              <a:t>riêng tư</a:t>
-            </a:r>
-            <a:endParaRPr lang="vi-VN" dirty="0" smtClean="0">
-              <a:solidFill>
-                <a:srgbClr val="253858"/>
-              </a:solidFill>
-            </a:endParaRPr>
           </a:p>
         </p:txBody>
       </p:sp>
@@ -16124,19 +16672,7 @@
                 <a:cs typeface="Helvetica Neue"/>
                 <a:sym typeface="Helvetica Neue"/>
               </a:rPr>
-              <a:t> </a:t>
-            </a:r>
-            <a:r>
-              <a:rPr lang="en-US" sz="4800" b="0" i="0" u="none" strike="noStrike" cap="none" dirty="0" smtClean="0">
-                <a:solidFill>
-                  <a:srgbClr val="253858"/>
-                </a:solidFill>
-                <a:latin typeface="Helvetica Neue"/>
-                <a:ea typeface="Helvetica Neue"/>
-                <a:cs typeface="Helvetica Neue"/>
-                <a:sym typeface="Helvetica Neue"/>
-              </a:rPr>
-              <a:t>commit –m “”</a:t>
+              <a:t> commit</a:t>
             </a:r>
             <a:endParaRPr dirty="0"/>
           </a:p>

</xml_diff>

<commit_message>
Revert "Revert "thay doi du an lan thu 1""
This reverts commit c77ea2074f0e458bf564dd2bedeaf85895b7f0d1.
</commit_message>
<xml_diff>
--- a/Git-presentation-16072017.pptx
+++ b/Git-presentation-16072017.pptx
@@ -5,7 +5,7 @@
     <p:sldMasterId id="2147483662" r:id="rId1"/>
   </p:sldMasterIdLst>
   <p:notesMasterIdLst>
-    <p:notesMasterId r:id="rId15"/>
+    <p:notesMasterId r:id="rId13"/>
   </p:notesMasterIdLst>
   <p:sldIdLst>
     <p:sldId id="256" r:id="rId2"/>
@@ -19,39 +19,37 @@
     <p:sldId id="266" r:id="rId10"/>
     <p:sldId id="268" r:id="rId11"/>
     <p:sldId id="269" r:id="rId12"/>
-    <p:sldId id="270" r:id="rId13"/>
-    <p:sldId id="271" r:id="rId14"/>
   </p:sldIdLst>
   <p:sldSz cx="24384000" cy="13716000"/>
   <p:notesSz cx="6858000" cy="9144000"/>
   <p:embeddedFontLst>
     <p:embeddedFont>
-      <p:font typeface="Helvetica Neue" panose="020B0604020202020204" charset="0"/>
-      <p:regular r:id="rId16"/>
-      <p:bold r:id="rId17"/>
-      <p:italic r:id="rId18"/>
-      <p:boldItalic r:id="rId19"/>
+      <p:font typeface="Roboto" panose="020B0604020202020204" charset="0"/>
+      <p:regular r:id="rId14"/>
+      <p:bold r:id="rId15"/>
+      <p:italic r:id="rId16"/>
+      <p:boldItalic r:id="rId17"/>
     </p:embeddedFont>
     <p:embeddedFont>
       <p:font typeface="Merriweather" panose="020B0604020202020204" charset="-93"/>
-      <p:regular r:id="rId20"/>
-      <p:bold r:id="rId21"/>
-      <p:italic r:id="rId22"/>
-      <p:boldItalic r:id="rId23"/>
+      <p:regular r:id="rId18"/>
+      <p:bold r:id="rId19"/>
+      <p:italic r:id="rId20"/>
+      <p:boldItalic r:id="rId21"/>
+    </p:embeddedFont>
+    <p:embeddedFont>
+      <p:font typeface="Helvetica Neue" panose="020B0604020202020204" charset="0"/>
+      <p:regular r:id="rId22"/>
+      <p:bold r:id="rId23"/>
+      <p:italic r:id="rId24"/>
+      <p:boldItalic r:id="rId25"/>
     </p:embeddedFont>
     <p:embeddedFont>
       <p:font typeface="Helvetica Neue Light" panose="020B0604020202020204" charset="0"/>
-      <p:regular r:id="rId24"/>
-      <p:bold r:id="rId25"/>
-      <p:italic r:id="rId26"/>
-      <p:boldItalic r:id="rId27"/>
-    </p:embeddedFont>
-    <p:embeddedFont>
-      <p:font typeface="Roboto" panose="020B0604020202020204" charset="0"/>
-      <p:regular r:id="rId28"/>
-      <p:bold r:id="rId29"/>
-      <p:italic r:id="rId30"/>
-      <p:boldItalic r:id="rId31"/>
+      <p:regular r:id="rId26"/>
+      <p:bold r:id="rId27"/>
+      <p:italic r:id="rId28"/>
+      <p:boldItalic r:id="rId29"/>
     </p:embeddedFont>
   </p:embeddedFontLst>
   <p:defaultTextStyle>
@@ -1064,214 +1062,6 @@
       <p:sp>
         <p:nvSpPr>
           <p:cNvPr id="162" name="Google Shape;162;p20:notes"/>
-          <p:cNvSpPr>
-            <a:spLocks noGrp="1" noRot="1" noChangeAspect="1"/>
-          </p:cNvSpPr>
-          <p:nvPr>
-            <p:ph type="sldImg" idx="2"/>
-          </p:nvPr>
-        </p:nvSpPr>
-        <p:spPr>
-          <a:xfrm>
-            <a:off x="381000" y="685800"/>
-            <a:ext cx="6096000" cy="3429000"/>
-          </a:xfrm>
-          <a:custGeom>
-            <a:avLst/>
-            <a:gdLst/>
-            <a:ahLst/>
-            <a:cxnLst/>
-            <a:rect l="l" t="t" r="r" b="b"/>
-            <a:pathLst>
-              <a:path w="120000" h="120000" extrusionOk="0">
-                <a:moveTo>
-                  <a:pt x="0" y="0"/>
-                </a:moveTo>
-                <a:lnTo>
-                  <a:pt x="120000" y="0"/>
-                </a:lnTo>
-                <a:lnTo>
-                  <a:pt x="120000" y="120000"/>
-                </a:lnTo>
-                <a:lnTo>
-                  <a:pt x="0" y="120000"/>
-                </a:lnTo>
-                <a:close/>
-              </a:path>
-            </a:pathLst>
-          </a:custGeom>
-        </p:spPr>
-      </p:sp>
-    </p:spTree>
-  </p:cSld>
-  <p:clrMapOvr>
-    <a:masterClrMapping/>
-  </p:clrMapOvr>
-</p:notes>
-</file>
-
-<file path=ppt/notesSlides/notesSlide12.xml><?xml version="1.0" encoding="utf-8"?>
-<p:notes xmlns:a="http://schemas.openxmlformats.org/drawingml/2006/main" xmlns:r="http://schemas.openxmlformats.org/officeDocument/2006/relationships" xmlns:p="http://schemas.openxmlformats.org/presentationml/2006/main" showMasterSp="0" showMasterPhAnim="0">
-  <p:cSld>
-    <p:spTree>
-      <p:nvGrpSpPr>
-        <p:cNvPr id="1" name="Shape 167"/>
-        <p:cNvGrpSpPr/>
-        <p:nvPr/>
-      </p:nvGrpSpPr>
-      <p:grpSpPr>
-        <a:xfrm>
-          <a:off x="0" y="0"/>
-          <a:ext cx="0" cy="0"/>
-          <a:chOff x="0" y="0"/>
-          <a:chExt cx="0" cy="0"/>
-        </a:xfrm>
-      </p:grpSpPr>
-      <p:sp>
-        <p:nvSpPr>
-          <p:cNvPr id="168" name="Google Shape;168;p21:notes"/>
-          <p:cNvSpPr txBox="1">
-            <a:spLocks noGrp="1"/>
-          </p:cNvSpPr>
-          <p:nvPr>
-            <p:ph type="body" idx="1"/>
-          </p:nvPr>
-        </p:nvSpPr>
-        <p:spPr>
-          <a:xfrm>
-            <a:off x="914400" y="4343400"/>
-            <a:ext cx="5029200" cy="4114800"/>
-          </a:xfrm>
-          <a:prstGeom prst="rect">
-            <a:avLst/>
-          </a:prstGeom>
-        </p:spPr>
-        <p:txBody>
-          <a:bodyPr spcFirstLastPara="1" wrap="square" lIns="91425" tIns="91425" rIns="91425" bIns="91425" anchor="t" anchorCtr="0">
-            <a:noAutofit/>
-          </a:bodyPr>
-          <a:lstStyle/>
-          <a:p>
-            <a:pPr marL="0" lvl="0" indent="0" algn="l" rtl="0">
-              <a:spcBef>
-                <a:spcPts val="0"/>
-              </a:spcBef>
-              <a:spcAft>
-                <a:spcPts val="0"/>
-              </a:spcAft>
-              <a:buNone/>
-            </a:pPr>
-            <a:endParaRPr/>
-          </a:p>
-        </p:txBody>
-      </p:sp>
-      <p:sp>
-        <p:nvSpPr>
-          <p:cNvPr id="169" name="Google Shape;169;p21:notes"/>
-          <p:cNvSpPr>
-            <a:spLocks noGrp="1" noRot="1" noChangeAspect="1"/>
-          </p:cNvSpPr>
-          <p:nvPr>
-            <p:ph type="sldImg" idx="2"/>
-          </p:nvPr>
-        </p:nvSpPr>
-        <p:spPr>
-          <a:xfrm>
-            <a:off x="381000" y="685800"/>
-            <a:ext cx="6096000" cy="3429000"/>
-          </a:xfrm>
-          <a:custGeom>
-            <a:avLst/>
-            <a:gdLst/>
-            <a:ahLst/>
-            <a:cxnLst/>
-            <a:rect l="l" t="t" r="r" b="b"/>
-            <a:pathLst>
-              <a:path w="120000" h="120000" extrusionOk="0">
-                <a:moveTo>
-                  <a:pt x="0" y="0"/>
-                </a:moveTo>
-                <a:lnTo>
-                  <a:pt x="120000" y="0"/>
-                </a:lnTo>
-                <a:lnTo>
-                  <a:pt x="120000" y="120000"/>
-                </a:lnTo>
-                <a:lnTo>
-                  <a:pt x="0" y="120000"/>
-                </a:lnTo>
-                <a:close/>
-              </a:path>
-            </a:pathLst>
-          </a:custGeom>
-        </p:spPr>
-      </p:sp>
-    </p:spTree>
-  </p:cSld>
-  <p:clrMapOvr>
-    <a:masterClrMapping/>
-  </p:clrMapOvr>
-</p:notes>
-</file>
-
-<file path=ppt/notesSlides/notesSlide13.xml><?xml version="1.0" encoding="utf-8"?>
-<p:notes xmlns:a="http://schemas.openxmlformats.org/drawingml/2006/main" xmlns:r="http://schemas.openxmlformats.org/officeDocument/2006/relationships" xmlns:p="http://schemas.openxmlformats.org/presentationml/2006/main" showMasterSp="0" showMasterPhAnim="0">
-  <p:cSld>
-    <p:spTree>
-      <p:nvGrpSpPr>
-        <p:cNvPr id="1" name="Shape 173"/>
-        <p:cNvGrpSpPr/>
-        <p:nvPr/>
-      </p:nvGrpSpPr>
-      <p:grpSpPr>
-        <a:xfrm>
-          <a:off x="0" y="0"/>
-          <a:ext cx="0" cy="0"/>
-          <a:chOff x="0" y="0"/>
-          <a:chExt cx="0" cy="0"/>
-        </a:xfrm>
-      </p:grpSpPr>
-      <p:sp>
-        <p:nvSpPr>
-          <p:cNvPr id="174" name="Google Shape;174;p22:notes"/>
-          <p:cNvSpPr txBox="1">
-            <a:spLocks noGrp="1"/>
-          </p:cNvSpPr>
-          <p:nvPr>
-            <p:ph type="body" idx="1"/>
-          </p:nvPr>
-        </p:nvSpPr>
-        <p:spPr>
-          <a:xfrm>
-            <a:off x="914400" y="4343400"/>
-            <a:ext cx="5029200" cy="4114800"/>
-          </a:xfrm>
-          <a:prstGeom prst="rect">
-            <a:avLst/>
-          </a:prstGeom>
-        </p:spPr>
-        <p:txBody>
-          <a:bodyPr spcFirstLastPara="1" wrap="square" lIns="91425" tIns="91425" rIns="91425" bIns="91425" anchor="t" anchorCtr="0">
-            <a:noAutofit/>
-          </a:bodyPr>
-          <a:lstStyle/>
-          <a:p>
-            <a:pPr marL="0" lvl="0" indent="0" algn="l" rtl="0">
-              <a:spcBef>
-                <a:spcPts val="0"/>
-              </a:spcBef>
-              <a:spcAft>
-                <a:spcPts val="0"/>
-              </a:spcAft>
-              <a:buNone/>
-            </a:pPr>
-            <a:endParaRPr/>
-          </a:p>
-        </p:txBody>
-      </p:sp>
-      <p:sp>
-        <p:nvSpPr>
-          <p:cNvPr id="175" name="Google Shape;175;p22:notes"/>
           <p:cNvSpPr>
             <a:spLocks noGrp="1" noRot="1" noChangeAspect="1"/>
           </p:cNvSpPr>
@@ -13360,388 +13150,6 @@
 </p:sld>
 </file>
 
-<file path=ppt/slides/slide12.xml><?xml version="1.0" encoding="utf-8"?>
-<p:sld xmlns:a="http://schemas.openxmlformats.org/drawingml/2006/main" xmlns:r="http://schemas.openxmlformats.org/officeDocument/2006/relationships" xmlns:p="http://schemas.openxmlformats.org/presentationml/2006/main">
-  <p:cSld>
-    <p:spTree>
-      <p:nvGrpSpPr>
-        <p:cNvPr id="1" name="Shape 170"/>
-        <p:cNvGrpSpPr/>
-        <p:nvPr/>
-      </p:nvGrpSpPr>
-      <p:grpSpPr>
-        <a:xfrm>
-          <a:off x="0" y="0"/>
-          <a:ext cx="0" cy="0"/>
-          <a:chOff x="0" y="0"/>
-          <a:chExt cx="0" cy="0"/>
-        </a:xfrm>
-      </p:grpSpPr>
-      <p:sp>
-        <p:nvSpPr>
-          <p:cNvPr id="171" name="Google Shape;171;p30"/>
-          <p:cNvSpPr txBox="1">
-            <a:spLocks noGrp="1"/>
-          </p:cNvSpPr>
-          <p:nvPr>
-            <p:ph type="body" idx="1"/>
-          </p:nvPr>
-        </p:nvSpPr>
-        <p:spPr>
-          <a:xfrm>
-            <a:off x="4381243" y="5407024"/>
-            <a:ext cx="15621514" cy="1879601"/>
-          </a:xfrm>
-          <a:prstGeom prst="rect">
-            <a:avLst/>
-          </a:prstGeom>
-          <a:noFill/>
-          <a:ln>
-            <a:noFill/>
-          </a:ln>
-        </p:spPr>
-        <p:txBody>
-          <a:bodyPr spcFirstLastPara="1" wrap="square" lIns="38100" tIns="38100" rIns="38100" bIns="38100" anchor="b" anchorCtr="0">
-            <a:noAutofit/>
-          </a:bodyPr>
-          <a:lstStyle/>
-          <a:p>
-            <a:pPr marL="0" marR="0" lvl="0" indent="0" algn="ctr" rtl="0">
-              <a:lnSpc>
-                <a:spcPct val="100000"/>
-              </a:lnSpc>
-              <a:spcBef>
-                <a:spcPts val="0"/>
-              </a:spcBef>
-              <a:spcAft>
-                <a:spcPts val="0"/>
-              </a:spcAft>
-              <a:buClr>
-                <a:srgbClr val="FFFFFF"/>
-              </a:buClr>
-              <a:buFont typeface="Helvetica Neue"/>
-              <a:buNone/>
-            </a:pPr>
-            <a:r>
-              <a:rPr lang="en-US" sz="11800" b="1" i="0" u="none" strike="noStrike" cap="none">
-                <a:solidFill>
-                  <a:srgbClr val="FFFFFF"/>
-                </a:solidFill>
-                <a:latin typeface="Helvetica Neue"/>
-                <a:ea typeface="Helvetica Neue"/>
-                <a:cs typeface="Helvetica Neue"/>
-                <a:sym typeface="Helvetica Neue"/>
-              </a:rPr>
-              <a:t>Nâng cao</a:t>
-            </a:r>
-            <a:endParaRPr/>
-          </a:p>
-        </p:txBody>
-      </p:sp>
-      <p:sp>
-        <p:nvSpPr>
-          <p:cNvPr id="172" name="Google Shape;172;p30"/>
-          <p:cNvSpPr txBox="1">
-            <a:spLocks noGrp="1"/>
-          </p:cNvSpPr>
-          <p:nvPr>
-            <p:ph type="body" idx="2"/>
-          </p:nvPr>
-        </p:nvSpPr>
-        <p:spPr>
-          <a:xfrm>
-            <a:off x="4381243" y="7241381"/>
-            <a:ext cx="15621514" cy="774701"/>
-          </a:xfrm>
-          <a:prstGeom prst="rect">
-            <a:avLst/>
-          </a:prstGeom>
-          <a:noFill/>
-          <a:ln>
-            <a:noFill/>
-          </a:ln>
-        </p:spPr>
-        <p:txBody>
-          <a:bodyPr spcFirstLastPara="1" wrap="square" lIns="38100" tIns="38100" rIns="38100" bIns="38100" anchor="t" anchorCtr="0">
-            <a:noAutofit/>
-          </a:bodyPr>
-          <a:lstStyle/>
-          <a:p>
-            <a:pPr marL="0" marR="0" lvl="0" indent="0" algn="ctr" rtl="0">
-              <a:lnSpc>
-                <a:spcPct val="100000"/>
-              </a:lnSpc>
-              <a:spcBef>
-                <a:spcPts val="0"/>
-              </a:spcBef>
-              <a:spcAft>
-                <a:spcPts val="0"/>
-              </a:spcAft>
-              <a:buClr>
-                <a:srgbClr val="FFFFFF"/>
-              </a:buClr>
-              <a:buFont typeface="Helvetica Neue"/>
-              <a:buNone/>
-            </a:pPr>
-            <a:r>
-              <a:rPr lang="en-US" sz="4600" b="0" i="0" u="none" strike="noStrike" cap="none">
-                <a:solidFill>
-                  <a:srgbClr val="FFFFFF"/>
-                </a:solidFill>
-                <a:latin typeface="Helvetica Neue"/>
-                <a:ea typeface="Helvetica Neue"/>
-                <a:cs typeface="Helvetica Neue"/>
-                <a:sym typeface="Helvetica Neue"/>
-              </a:rPr>
-              <a:t>Conflict Resolving &amp; Pull Request</a:t>
-            </a:r>
-            <a:endParaRPr/>
-          </a:p>
-        </p:txBody>
-      </p:sp>
-    </p:spTree>
-  </p:cSld>
-  <p:clrMapOvr>
-    <a:masterClrMapping/>
-  </p:clrMapOvr>
-</p:sld>
-</file>
-
-<file path=ppt/slides/slide13.xml><?xml version="1.0" encoding="utf-8"?>
-<p:sld xmlns:a="http://schemas.openxmlformats.org/drawingml/2006/main" xmlns:r="http://schemas.openxmlformats.org/officeDocument/2006/relationships" xmlns:p="http://schemas.openxmlformats.org/presentationml/2006/main">
-  <p:cSld>
-    <p:spTree>
-      <p:nvGrpSpPr>
-        <p:cNvPr id="1" name="Shape 176"/>
-        <p:cNvGrpSpPr/>
-        <p:nvPr/>
-      </p:nvGrpSpPr>
-      <p:grpSpPr>
-        <a:xfrm>
-          <a:off x="0" y="0"/>
-          <a:ext cx="0" cy="0"/>
-          <a:chOff x="0" y="0"/>
-          <a:chExt cx="0" cy="0"/>
-        </a:xfrm>
-      </p:grpSpPr>
-      <p:sp>
-        <p:nvSpPr>
-          <p:cNvPr id="177" name="Google Shape;177;p31"/>
-          <p:cNvSpPr txBox="1">
-            <a:spLocks noGrp="1"/>
-          </p:cNvSpPr>
-          <p:nvPr>
-            <p:ph type="body" idx="2"/>
-          </p:nvPr>
-        </p:nvSpPr>
-        <p:spPr>
-          <a:xfrm>
-            <a:off x="1711021" y="1035446"/>
-            <a:ext cx="20828001" cy="838201"/>
-          </a:xfrm>
-          <a:prstGeom prst="rect">
-            <a:avLst/>
-          </a:prstGeom>
-          <a:noFill/>
-          <a:ln>
-            <a:noFill/>
-          </a:ln>
-        </p:spPr>
-        <p:txBody>
-          <a:bodyPr spcFirstLastPara="1" wrap="square" lIns="50800" tIns="50800" rIns="50800" bIns="50800" anchor="ctr" anchorCtr="0">
-            <a:noAutofit/>
-          </a:bodyPr>
-          <a:lstStyle/>
-          <a:p>
-            <a:pPr marL="0" marR="0" lvl="0" indent="0" algn="l" rtl="0">
-              <a:lnSpc>
-                <a:spcPct val="100000"/>
-              </a:lnSpc>
-              <a:spcBef>
-                <a:spcPts val="0"/>
-              </a:spcBef>
-              <a:spcAft>
-                <a:spcPts val="0"/>
-              </a:spcAft>
-              <a:buClr>
-                <a:srgbClr val="0747A6"/>
-              </a:buClr>
-              <a:buFont typeface="Helvetica Neue"/>
-              <a:buNone/>
-            </a:pPr>
-            <a:r>
-              <a:rPr lang="en-US" sz="4800" b="1" i="0" u="none" strike="noStrike" cap="none">
-                <a:solidFill>
-                  <a:srgbClr val="0747A6"/>
-                </a:solidFill>
-                <a:latin typeface="Helvetica Neue"/>
-                <a:ea typeface="Helvetica Neue"/>
-                <a:cs typeface="Helvetica Neue"/>
-                <a:sym typeface="Helvetica Neue"/>
-              </a:rPr>
-              <a:t>PULL REQUEST</a:t>
-            </a:r>
-            <a:endParaRPr/>
-          </a:p>
-        </p:txBody>
-      </p:sp>
-      <p:sp>
-        <p:nvSpPr>
-          <p:cNvPr id="178" name="Google Shape;178;p31"/>
-          <p:cNvSpPr/>
-          <p:nvPr/>
-        </p:nvSpPr>
-        <p:spPr>
-          <a:xfrm>
-            <a:off x="1711021" y="3306937"/>
-            <a:ext cx="20828000" cy="2311401"/>
-          </a:xfrm>
-          <a:prstGeom prst="rect">
-            <a:avLst/>
-          </a:prstGeom>
-          <a:noFill/>
-          <a:ln>
-            <a:noFill/>
-          </a:ln>
-        </p:spPr>
-        <p:txBody>
-          <a:bodyPr spcFirstLastPara="1" wrap="square" lIns="50800" tIns="50800" rIns="50800" bIns="50800" anchor="t" anchorCtr="0">
-            <a:noAutofit/>
-          </a:bodyPr>
-          <a:lstStyle/>
-          <a:p>
-            <a:pPr marL="635000" marR="0" lvl="0" indent="-635000" algn="l" rtl="0">
-              <a:lnSpc>
-                <a:spcPct val="100000"/>
-              </a:lnSpc>
-              <a:spcBef>
-                <a:spcPts val="0"/>
-              </a:spcBef>
-              <a:spcAft>
-                <a:spcPts val="0"/>
-              </a:spcAft>
-              <a:buClr>
-                <a:srgbClr val="253858"/>
-              </a:buClr>
-              <a:buSzPts val="6000"/>
-              <a:buFont typeface="Helvetica Neue"/>
-              <a:buChar char="•"/>
-            </a:pPr>
-            <a:r>
-              <a:rPr lang="en-US" sz="4800" b="0" i="0" u="none" strike="noStrike" cap="none">
-                <a:solidFill>
-                  <a:srgbClr val="253858"/>
-                </a:solidFill>
-                <a:latin typeface="Helvetica Neue"/>
-                <a:ea typeface="Helvetica Neue"/>
-                <a:cs typeface="Helvetica Neue"/>
-                <a:sym typeface="Helvetica Neue"/>
-              </a:rPr>
-              <a:t>Đơn giản chỉ là: Ê code nè, merge giùm đi!</a:t>
-            </a:r>
-            <a:endParaRPr/>
-          </a:p>
-          <a:p>
-            <a:pPr marL="635000" marR="0" lvl="0" indent="-635000" algn="l" rtl="0">
-              <a:lnSpc>
-                <a:spcPct val="100000"/>
-              </a:lnSpc>
-              <a:spcBef>
-                <a:spcPts val="0"/>
-              </a:spcBef>
-              <a:spcAft>
-                <a:spcPts val="0"/>
-              </a:spcAft>
-              <a:buClr>
-                <a:srgbClr val="253858"/>
-              </a:buClr>
-              <a:buSzPts val="6000"/>
-              <a:buFont typeface="Helvetica Neue"/>
-              <a:buChar char="•"/>
-            </a:pPr>
-            <a:r>
-              <a:rPr lang="en-US" sz="4800" b="0" i="0" u="none" strike="noStrike" cap="none">
-                <a:solidFill>
-                  <a:srgbClr val="253858"/>
-                </a:solidFill>
-                <a:latin typeface="Helvetica Neue"/>
-                <a:ea typeface="Helvetica Neue"/>
-                <a:cs typeface="Helvetica Neue"/>
-                <a:sym typeface="Helvetica Neue"/>
-              </a:rPr>
-              <a:t>Giúp commit ngắn gọn hơn</a:t>
-            </a:r>
-            <a:endParaRPr/>
-          </a:p>
-          <a:p>
-            <a:pPr marL="635000" marR="0" lvl="0" indent="-635000" algn="l" rtl="0">
-              <a:lnSpc>
-                <a:spcPct val="100000"/>
-              </a:lnSpc>
-              <a:spcBef>
-                <a:spcPts val="0"/>
-              </a:spcBef>
-              <a:spcAft>
-                <a:spcPts val="0"/>
-              </a:spcAft>
-              <a:buClr>
-                <a:srgbClr val="253858"/>
-              </a:buClr>
-              <a:buSzPts val="6000"/>
-              <a:buFont typeface="Helvetica Neue"/>
-              <a:buChar char="•"/>
-            </a:pPr>
-            <a:r>
-              <a:rPr lang="en-US" sz="4800" b="0" i="0" u="none" strike="noStrike" cap="none">
-                <a:solidFill>
-                  <a:srgbClr val="253858"/>
-                </a:solidFill>
-                <a:latin typeface="Helvetica Neue"/>
-                <a:ea typeface="Helvetica Neue"/>
-                <a:cs typeface="Helvetica Neue"/>
-                <a:sym typeface="Helvetica Neue"/>
-              </a:rPr>
-              <a:t>Hỗ trợ code review, ngăn code ẩu</a:t>
-            </a:r>
-            <a:endParaRPr/>
-          </a:p>
-        </p:txBody>
-      </p:sp>
-      <p:pic>
-        <p:nvPicPr>
-          <p:cNvPr id="179" name="Google Shape;179;p31" descr="pasted-image.tiff"/>
-          <p:cNvPicPr preferRelativeResize="0"/>
-          <p:nvPr/>
-        </p:nvPicPr>
-        <p:blipFill rotWithShape="1">
-          <a:blip r:embed="rId3">
-            <a:alphaModFix/>
-          </a:blip>
-          <a:srcRect/>
-          <a:stretch/>
-        </p:blipFill>
-        <p:spPr>
-          <a:xfrm>
-            <a:off x="12371875" y="6329557"/>
-            <a:ext cx="11396820" cy="6751443"/>
-          </a:xfrm>
-          <a:prstGeom prst="rect">
-            <a:avLst/>
-          </a:prstGeom>
-          <a:noFill/>
-          <a:ln>
-            <a:noFill/>
-          </a:ln>
-        </p:spPr>
-      </p:pic>
-    </p:spTree>
-  </p:cSld>
-  <p:clrMapOvr>
-    <a:masterClrMapping/>
-  </p:clrMapOvr>
-</p:sld>
-</file>
-
 <file path=ppt/slides/slide2.xml><?xml version="1.0" encoding="utf-8"?>
 <p:sld xmlns:a="http://schemas.openxmlformats.org/drawingml/2006/main" xmlns:r="http://schemas.openxmlformats.org/officeDocument/2006/relationships" xmlns:p="http://schemas.openxmlformats.org/presentationml/2006/main">
   <p:cSld>
@@ -13771,7 +13179,7 @@
         </p:nvSpPr>
         <p:spPr>
           <a:xfrm>
-            <a:off x="1711025" y="3306926"/>
+            <a:off x="1066800" y="2438400"/>
             <a:ext cx="20828100" cy="7974900"/>
           </a:xfrm>
           <a:prstGeom prst="rect">
@@ -13899,10 +13307,10 @@
                 <a:cs typeface="Helvetica Neue"/>
                 <a:sym typeface="Helvetica Neue"/>
               </a:rPr>
-              <a:t> Version Control, </a:t>
-            </a:r>
-            <a:r>
-              <a:rPr lang="en-US" sz="4800" b="0" i="0" u="none" strike="noStrike" cap="none" dirty="0" err="1">
+              <a:t> </a:t>
+            </a:r>
+            <a:r>
+              <a:rPr lang="en-US" sz="4800" b="0" i="0" u="none" strike="noStrike" cap="none" dirty="0" err="1" smtClean="0">
                 <a:solidFill>
                   <a:srgbClr val="253858"/>
                 </a:solidFill>
@@ -13914,6 +13322,18 @@
               <a:t>Git</a:t>
             </a:r>
             <a:r>
+              <a:rPr lang="en-US" sz="4800" b="0" i="0" u="none" strike="noStrike" cap="none" dirty="0" smtClean="0">
+                <a:solidFill>
+                  <a:srgbClr val="253858"/>
+                </a:solidFill>
+                <a:latin typeface="Helvetica Neue"/>
+                <a:ea typeface="Helvetica Neue"/>
+                <a:cs typeface="Helvetica Neue"/>
+                <a:sym typeface="Helvetica Neue"/>
+              </a:rPr>
+              <a:t> </a:t>
+            </a:r>
+            <a:r>
               <a:rPr lang="en-US" sz="4800" b="0" i="0" u="none" strike="noStrike" cap="none" dirty="0">
                 <a:solidFill>
                   <a:srgbClr val="253858"/>
@@ -13923,7 +13343,7 @@
                 <a:cs typeface="Helvetica Neue"/>
                 <a:sym typeface="Helvetica Neue"/>
               </a:rPr>
-              <a:t> &amp; </a:t>
+              <a:t>&amp; </a:t>
             </a:r>
             <a:r>
               <a:rPr lang="en-US" sz="4800" b="0" i="0" u="none" strike="noStrike" cap="none" dirty="0" err="1">
@@ -15355,35 +14775,21 @@
                   <a:srgbClr val="253858"/>
                 </a:solidFill>
               </a:rPr>
-              <a:t>iết ai là người tác động thai đổi và dự án.</a:t>
-            </a:r>
-          </a:p>
-          <a:p>
-            <a:pPr marL="635000" marR="0" lvl="0" indent="-635000" algn="l" rtl="0">
-              <a:lnSpc>
-                <a:spcPct val="100000"/>
-              </a:lnSpc>
-              <a:spcBef>
-                <a:spcPts val="0"/>
-              </a:spcBef>
-              <a:spcAft>
-                <a:spcPts val="0"/>
-              </a:spcAft>
-              <a:buClr>
+              <a:t>iết ai là người tác động thai đổi và dự án</a:t>
+            </a:r>
+            <a:r>
+              <a:rPr lang="vi-VN" dirty="0" smtClean="0">
+                <a:solidFill>
+                  <a:srgbClr val="253858"/>
+                </a:solidFill>
+              </a:rPr>
+              <a:t>.</a:t>
+            </a:r>
+            <a:endParaRPr lang="vi-VN" dirty="0" smtClean="0">
+              <a:solidFill>
                 <a:srgbClr val="253858"/>
-              </a:buClr>
-              <a:buSzPts val="6000"/>
-              <a:buFont typeface="Helvetica Neue"/>
-              <a:buChar char="•"/>
-            </a:pPr>
-            <a:r>
-              <a:rPr lang="vi-VN" dirty="0" smtClean="0">
-                <a:solidFill>
-                  <a:srgbClr val="253858"/>
-                </a:solidFill>
-              </a:rPr>
-              <a:t>Mà git là một trong những hệ thống Version Contronl phổ biết nhất hiện nay</a:t>
-            </a:r>
+              </a:solidFill>
+            </a:endParaRPr>
           </a:p>
           <a:p>
             <a:pPr marL="635000" marR="0" lvl="0" indent="-635000" algn="l" rtl="0">
@@ -15503,11 +14909,15 @@
               <a:buNone/>
             </a:pPr>
             <a:r>
-              <a:rPr lang="en-US" dirty="0"/>
-              <a:t>SOURCE CONTROL/</a:t>
-            </a:r>
-            <a:r>
-              <a:rPr lang="en-US" sz="4800" b="1" i="0" u="none" strike="noStrike" cap="none" dirty="0">
+              <a:rPr lang="en-US" dirty="0" err="1" smtClean="0"/>
+              <a:t>Git</a:t>
+            </a:r>
+            <a:r>
+              <a:rPr lang="en-US" dirty="0" smtClean="0"/>
+              <a:t> </a:t>
+            </a:r>
+            <a:r>
+              <a:rPr lang="en-US" sz="4800" b="1" i="0" u="none" strike="noStrike" cap="none" dirty="0" smtClean="0">
                 <a:solidFill>
                   <a:srgbClr val="0747A6"/>
                 </a:solidFill>
@@ -15516,7 +14926,7 @@
                 <a:cs typeface="Helvetica Neue"/>
                 <a:sym typeface="Helvetica Neue"/>
               </a:rPr>
-              <a:t>VERSION CONTROL LÀ </a:t>
+              <a:t>LÀ </a:t>
             </a:r>
             <a:r>
               <a:rPr lang="en-US" sz="4800" b="1" i="0" u="none" strike="noStrike" cap="none" dirty="0" smtClean="0">
@@ -15782,8 +15192,21 @@
                   <a:srgbClr val="253858"/>
                 </a:solidFill>
               </a:rPr>
-              <a:t>là nền tản quản lý mã nguồn trực tuyến</a:t>
-            </a:r>
+              <a:t>là nền tản quản lý mã nguồn trực </a:t>
+            </a:r>
+            <a:r>
+              <a:rPr lang="vi-VN" dirty="0" smtClean="0">
+                <a:solidFill>
+                  <a:srgbClr val="253858"/>
+                </a:solidFill>
+              </a:rPr>
+              <a:t>tuyến,Dựa trên Git</a:t>
+            </a:r>
+            <a:endParaRPr lang="vi-VN" dirty="0" smtClean="0">
+              <a:solidFill>
+                <a:srgbClr val="253858"/>
+              </a:solidFill>
+            </a:endParaRPr>
           </a:p>
           <a:p>
             <a:pPr marL="635000" lvl="0" indent="-635000" algn="l" rtl="0">
@@ -15870,7 +15293,23 @@
                   <a:srgbClr val="253858"/>
                 </a:solidFill>
               </a:rPr>
-              <a:t>ữ mã nguồn trực tuyến ,hổ trợ cộng tác giúp làm việc nhóm lớn với nhiều công cụ hổ trợ.</a:t>
+              <a:t>ữ mã nguồn trực tuyến ,hổ trợ </a:t>
+            </a:r>
+            <a:r>
+              <a:rPr lang="vi-VN" dirty="0" smtClean="0">
+                <a:solidFill>
+                  <a:srgbClr val="253858"/>
+                </a:solidFill>
+              </a:rPr>
+              <a:t>làm </a:t>
+            </a:r>
+            <a:r>
+              <a:rPr lang="vi-VN" dirty="0" smtClean="0">
+                <a:solidFill>
+                  <a:srgbClr val="253858"/>
+                </a:solidFill>
+              </a:rPr>
+              <a:t>việc nhóm lớn với nhiều công cụ hổ trợ.</a:t>
             </a:r>
             <a:endParaRPr lang="vi-VN" dirty="0">
               <a:solidFill>
@@ -15899,8 +15338,21 @@
                   <a:srgbClr val="253858"/>
                 </a:solidFill>
               </a:rPr>
-              <a:t>Có thể tạo Repository công cộng hoặc online</a:t>
-            </a:r>
+              <a:t>Có thể tạo Repository công cộng hoặc </a:t>
+            </a:r>
+            <a:r>
+              <a:rPr lang="vi-VN" dirty="0" smtClean="0">
+                <a:solidFill>
+                  <a:srgbClr val="253858"/>
+                </a:solidFill>
+              </a:rPr>
+              <a:t>riêng tư</a:t>
+            </a:r>
+            <a:endParaRPr lang="vi-VN" dirty="0" smtClean="0">
+              <a:solidFill>
+                <a:srgbClr val="253858"/>
+              </a:solidFill>
+            </a:endParaRPr>
           </a:p>
         </p:txBody>
       </p:sp>
@@ -16672,7 +16124,19 @@
                 <a:cs typeface="Helvetica Neue"/>
                 <a:sym typeface="Helvetica Neue"/>
               </a:rPr>
-              <a:t> commit</a:t>
+              <a:t> </a:t>
+            </a:r>
+            <a:r>
+              <a:rPr lang="en-US" sz="4800" b="0" i="0" u="none" strike="noStrike" cap="none" dirty="0" smtClean="0">
+                <a:solidFill>
+                  <a:srgbClr val="253858"/>
+                </a:solidFill>
+                <a:latin typeface="Helvetica Neue"/>
+                <a:ea typeface="Helvetica Neue"/>
+                <a:cs typeface="Helvetica Neue"/>
+                <a:sym typeface="Helvetica Neue"/>
+              </a:rPr>
+              <a:t>commit –m “”</a:t>
             </a:r>
             <a:endParaRPr dirty="0"/>
           </a:p>

</xml_diff>